<commit_message>
Updated C# and VS presentations
</commit_message>
<xml_diff>
--- a/Presentation/intro.pptx
+++ b/Presentation/intro.pptx
@@ -5,15 +5,16 @@
     <p:sldMasterId id="2147483648" r:id="rId1"/>
   </p:sldMasterIdLst>
   <p:notesMasterIdLst>
-    <p:notesMasterId r:id="rId8"/>
+    <p:notesMasterId r:id="rId9"/>
   </p:notesMasterIdLst>
   <p:sldIdLst>
     <p:sldId id="257" r:id="rId2"/>
-    <p:sldId id="264" r:id="rId3"/>
-    <p:sldId id="261" r:id="rId4"/>
-    <p:sldId id="262" r:id="rId5"/>
-    <p:sldId id="259" r:id="rId6"/>
-    <p:sldId id="263" r:id="rId7"/>
+    <p:sldId id="265" r:id="rId3"/>
+    <p:sldId id="264" r:id="rId4"/>
+    <p:sldId id="261" r:id="rId5"/>
+    <p:sldId id="262" r:id="rId6"/>
+    <p:sldId id="259" r:id="rId7"/>
+    <p:sldId id="263" r:id="rId8"/>
   </p:sldIdLst>
   <p:sldSz cx="9144000" cy="6858000" type="screen4x3"/>
   <p:notesSz cx="6858000" cy="9144000"/>
@@ -197,7 +198,7 @@
           <a:p>
             <a:fld id="{B24A7054-7FFB-49F4-A126-5DF6E687FF53}" type="datetimeFigureOut">
               <a:rPr lang="ru-RU" smtClean="0"/>
-              <a:t>06.11.2012</a:t>
+              <a:t>05.01.2013</a:t>
             </a:fld>
             <a:endParaRPr lang="ru-RU"/>
           </a:p>
@@ -1479,7 +1480,7 @@
           <a:p>
             <a:fld id="{8E6E6A2A-E9D3-4A0D-B04A-ABDD367A1E08}" type="datetimeFigureOut">
               <a:rPr lang="ru-RU" smtClean="0"/>
-              <a:t>06.11.2012</a:t>
+              <a:t>05.01.2013</a:t>
             </a:fld>
             <a:endParaRPr lang="ru-RU"/>
           </a:p>
@@ -2924,7 +2925,7 @@
           <a:p>
             <a:fld id="{AC3D3127-B7C4-45E3-9797-C527EC9FDD78}" type="datetimeFigureOut">
               <a:rPr lang="ru-RU" smtClean="0"/>
-              <a:t>06.11.2012</a:t>
+              <a:t>05.01.2013</a:t>
             </a:fld>
             <a:endParaRPr lang="ru-RU"/>
           </a:p>
@@ -3481,6 +3482,14 @@
 <file path=ppt/slides/slide2.xml><?xml version="1.0" encoding="utf-8"?>
 <p:sld xmlns:a="http://schemas.openxmlformats.org/drawingml/2006/main" xmlns:r="http://schemas.openxmlformats.org/officeDocument/2006/relationships" xmlns:p="http://schemas.openxmlformats.org/presentationml/2006/main">
   <p:cSld>
+    <p:bg>
+      <p:bgPr>
+        <a:solidFill>
+          <a:schemeClr val="accent1"/>
+        </a:solidFill>
+        <a:effectLst/>
+      </p:bgPr>
+    </p:bg>
     <p:spTree>
       <p:nvGrpSpPr>
         <p:cNvPr id="1" name=""/>
@@ -3495,94 +3504,51 @@
           <a:chExt cx="0" cy="0"/>
         </a:xfrm>
       </p:grpSpPr>
-      <p:sp>
-        <p:nvSpPr>
-          <p:cNvPr id="3" name="Rectangle 2"/>
-          <p:cNvSpPr/>
+      <p:pic>
+        <p:nvPicPr>
+          <p:cNvPr id="1026" name="Picture 2" descr="http://us.123rf.com/400wm/400/400/lurin/lurin1203/lurin120300011/12843555-black-and-red--please-turn-off-cell-phone--sign-with-black-border.jpg"/>
+          <p:cNvPicPr>
+            <a:picLocks noChangeAspect="1" noChangeArrowheads="1"/>
+          </p:cNvPicPr>
           <p:nvPr/>
-        </p:nvSpPr>
-        <p:spPr>
+        </p:nvPicPr>
+        <p:blipFill>
+          <a:blip r:embed="rId2">
+            <a:extLst>
+              <a:ext uri="{28A0092B-C50C-407E-A947-70E740481C1C}">
+                <a14:useLocalDpi xmlns:a14="http://schemas.microsoft.com/office/drawing/2010/main" val="0"/>
+              </a:ext>
+            </a:extLst>
+          </a:blip>
+          <a:srcRect/>
+          <a:stretch>
+            <a:fillRect/>
+          </a:stretch>
+        </p:blipFill>
+        <p:spPr bwMode="auto">
           <a:xfrm>
-            <a:off x="266775" y="1412776"/>
-            <a:ext cx="8640960" cy="830997"/>
+            <a:off x="2214563" y="481012"/>
+            <a:ext cx="4714875" cy="5895976"/>
           </a:xfrm>
           <a:prstGeom prst="rect">
             <a:avLst/>
           </a:prstGeom>
+          <a:noFill/>
+          <a:extLst>
+            <a:ext uri="{909E8E84-426E-40DD-AFC4-6F175D3DCCD1}">
+              <a14:hiddenFill xmlns:a14="http://schemas.microsoft.com/office/drawing/2010/main">
+                <a:solidFill>
+                  <a:srgbClr val="FFFFFF"/>
+                </a:solidFill>
+              </a14:hiddenFill>
+            </a:ext>
+          </a:extLst>
         </p:spPr>
-        <p:txBody>
-          <a:bodyPr wrap="square">
-            <a:spAutoFit/>
-          </a:bodyPr>
-          <a:lstStyle/>
-          <a:p>
-            <a:pPr lvl="0" algn="ctr"/>
-            <a:r>
-              <a:rPr lang="ru-RU" sz="4800" dirty="0" smtClean="0">
-                <a:solidFill>
-                  <a:schemeClr val="bg1"/>
-                </a:solidFill>
-              </a:rPr>
-              <a:t>Давайте знакомиться!</a:t>
-            </a:r>
-            <a:endParaRPr lang="ru-RU" sz="4800" dirty="0">
-              <a:solidFill>
-                <a:schemeClr val="bg1"/>
-              </a:solidFill>
-            </a:endParaRPr>
-          </a:p>
-        </p:txBody>
-      </p:sp>
-      <p:sp>
-        <p:nvSpPr>
-          <p:cNvPr id="4" name="Title 1"/>
-          <p:cNvSpPr txBox="1">
-            <a:spLocks/>
-          </p:cNvSpPr>
-          <p:nvPr/>
-        </p:nvSpPr>
-        <p:spPr>
-          <a:xfrm>
-            <a:off x="539552" y="2442002"/>
-            <a:ext cx="8229600" cy="1143000"/>
-          </a:xfrm>
-          <a:prstGeom prst="rect">
-            <a:avLst/>
-          </a:prstGeom>
-        </p:spPr>
-        <p:txBody>
-          <a:bodyPr vert="horz" lIns="91440" tIns="45720" rIns="91440" bIns="45720" rtlCol="0" anchor="ctr">
-            <a:normAutofit/>
-          </a:bodyPr>
-          <a:lstStyle>
-            <a:lvl1pPr algn="ctr" defTabSz="914400" rtl="0" eaLnBrk="1" latinLnBrk="0" hangingPunct="1">
-              <a:spcBef>
-                <a:spcPct val="0"/>
-              </a:spcBef>
-              <a:buNone/>
-              <a:defRPr sz="4400" kern="1200">
-                <a:solidFill>
-                  <a:schemeClr val="tx1"/>
-                </a:solidFill>
-                <a:latin typeface="+mj-lt"/>
-                <a:ea typeface="+mj-ea"/>
-                <a:cs typeface="+mj-cs"/>
-              </a:defRPr>
-            </a:lvl1pPr>
-          </a:lstStyle>
-          <a:p>
-            <a:r>
-              <a:rPr lang="en-US" dirty="0" smtClean="0"/>
-              <a:t>email@me.name</a:t>
-            </a:r>
-            <a:endParaRPr lang="ru-RU" dirty="0"/>
-          </a:p>
-        </p:txBody>
-      </p:sp>
+      </p:pic>
     </p:spTree>
     <p:extLst>
       <p:ext uri="{BB962C8B-B14F-4D97-AF65-F5344CB8AC3E}">
-        <p14:creationId xmlns:p14="http://schemas.microsoft.com/office/powerpoint/2010/main" val="1805584238"/>
+        <p14:creationId xmlns:p14="http://schemas.microsoft.com/office/powerpoint/2010/main" val="1119099355"/>
       </p:ext>
     </p:extLst>
   </p:cSld>
@@ -3624,8 +3590,8 @@
         </p:nvSpPr>
         <p:spPr>
           <a:xfrm>
-            <a:off x="251520" y="188640"/>
-            <a:ext cx="8640960" cy="769441"/>
+            <a:off x="266775" y="1412776"/>
+            <a:ext cx="8640960" cy="830997"/>
           </a:xfrm>
           <a:prstGeom prst="rect">
             <a:avLst/>
@@ -3639,14 +3605,14 @@
           <a:p>
             <a:pPr lvl="0" algn="ctr"/>
             <a:r>
-              <a:rPr lang="ru-RU" sz="4400" dirty="0" smtClean="0">
+              <a:rPr lang="ru-RU" sz="4800" dirty="0" smtClean="0">
                 <a:solidFill>
                   <a:schemeClr val="bg1"/>
                 </a:solidFill>
               </a:rPr>
-              <a:t>Организационные вопросы</a:t>
-            </a:r>
-            <a:endParaRPr lang="en-US" sz="4400" dirty="0">
+              <a:t>Давайте знакомиться!</a:t>
+            </a:r>
+            <a:endParaRPr lang="ru-RU" sz="4800" dirty="0">
               <a:solidFill>
                 <a:schemeClr val="bg1"/>
               </a:solidFill>
@@ -3656,218 +3622,54 @@
       </p:sp>
       <p:sp>
         <p:nvSpPr>
-          <p:cNvPr id="2" name="TextBox 1"/>
-          <p:cNvSpPr txBox="1"/>
+          <p:cNvPr id="4" name="Title 1"/>
+          <p:cNvSpPr txBox="1">
+            <a:spLocks/>
+          </p:cNvSpPr>
           <p:nvPr/>
         </p:nvSpPr>
         <p:spPr>
           <a:xfrm>
-            <a:off x="251520" y="1052736"/>
-            <a:ext cx="8640960" cy="4401205"/>
+            <a:off x="539552" y="2442002"/>
+            <a:ext cx="8229600" cy="1143000"/>
           </a:xfrm>
           <a:prstGeom prst="rect">
             <a:avLst/>
           </a:prstGeom>
-          <a:noFill/>
         </p:spPr>
         <p:txBody>
-          <a:bodyPr wrap="square" rtlCol="0">
-            <a:spAutoFit/>
+          <a:bodyPr vert="horz" lIns="91440" tIns="45720" rIns="91440" bIns="45720" rtlCol="0" anchor="ctr">
+            <a:normAutofit/>
           </a:bodyPr>
-          <a:lstStyle/>
-          <a:p>
-            <a:pPr marL="285750" indent="-285750">
-              <a:buFont typeface="Arial" pitchFamily="34" charset="0"/>
-              <a:buChar char="•"/>
-            </a:pPr>
-            <a:r>
-              <a:rPr lang="ru-RU" sz="2800" dirty="0">
-                <a:solidFill>
-                  <a:schemeClr val="bg1"/>
-                </a:solidFill>
-              </a:rPr>
-              <a:t>Начало </a:t>
-            </a:r>
-            <a:r>
-              <a:rPr lang="ru-RU" sz="2800" dirty="0" smtClean="0">
-                <a:solidFill>
-                  <a:schemeClr val="bg1"/>
-                </a:solidFill>
-              </a:rPr>
-              <a:t>занятий</a:t>
-            </a:r>
-          </a:p>
-          <a:p>
-            <a:pPr marL="285750" indent="-285750">
-              <a:buFont typeface="Arial" pitchFamily="34" charset="0"/>
-              <a:buChar char="•"/>
-            </a:pPr>
-            <a:r>
-              <a:rPr lang="ru-RU" sz="2800" dirty="0" smtClean="0">
-                <a:solidFill>
-                  <a:schemeClr val="bg1"/>
-                </a:solidFill>
-              </a:rPr>
-              <a:t>Посещаемость</a:t>
-            </a:r>
-          </a:p>
-          <a:p>
-            <a:pPr marL="285750" indent="-285750">
-              <a:buFont typeface="Arial" pitchFamily="34" charset="0"/>
-              <a:buChar char="•"/>
-            </a:pPr>
-            <a:r>
-              <a:rPr lang="ru-RU" sz="2800" dirty="0" smtClean="0">
-                <a:solidFill>
-                  <a:schemeClr val="bg1"/>
-                </a:solidFill>
-              </a:rPr>
-              <a:t>Домашняя </a:t>
-            </a:r>
-            <a:r>
-              <a:rPr lang="ru-RU" sz="2800" dirty="0" smtClean="0">
-                <a:solidFill>
-                  <a:schemeClr val="bg1"/>
-                </a:solidFill>
-              </a:rPr>
-              <a:t>работа</a:t>
-            </a:r>
-          </a:p>
-          <a:p>
-            <a:pPr marL="285750" indent="-285750">
-              <a:buFont typeface="Arial" pitchFamily="34" charset="0"/>
-              <a:buChar char="•"/>
-            </a:pPr>
-            <a:r>
-              <a:rPr lang="ru-RU" sz="2800" dirty="0" smtClean="0">
-                <a:solidFill>
-                  <a:schemeClr val="bg1"/>
-                </a:solidFill>
-              </a:rPr>
-              <a:t>Анкета</a:t>
-            </a:r>
-            <a:endParaRPr lang="ru-RU" sz="2800" dirty="0" smtClean="0">
-              <a:solidFill>
-                <a:schemeClr val="bg1"/>
-              </a:solidFill>
-            </a:endParaRPr>
-          </a:p>
-          <a:p>
-            <a:pPr marL="285750" indent="-285750">
-              <a:buFont typeface="Arial" pitchFamily="34" charset="0"/>
-              <a:buChar char="•"/>
-            </a:pPr>
-            <a:r>
-              <a:rPr lang="ru-RU" sz="2800" dirty="0" smtClean="0">
-                <a:solidFill>
-                  <a:schemeClr val="bg1"/>
-                </a:solidFill>
-              </a:rPr>
-              <a:t>Итоговый </a:t>
-            </a:r>
-            <a:r>
-              <a:rPr lang="ru-RU" sz="2800" dirty="0" smtClean="0">
-                <a:solidFill>
-                  <a:schemeClr val="bg1"/>
-                </a:solidFill>
-              </a:rPr>
-              <a:t>проект</a:t>
-            </a:r>
-            <a:endParaRPr lang="ru-RU" sz="2800" dirty="0" smtClean="0">
-              <a:solidFill>
-                <a:schemeClr val="bg1"/>
-              </a:solidFill>
-            </a:endParaRPr>
-          </a:p>
-          <a:p>
-            <a:pPr marL="285750" indent="-285750">
-              <a:buFont typeface="Arial" pitchFamily="34" charset="0"/>
-              <a:buChar char="•"/>
-            </a:pPr>
-            <a:r>
-              <a:rPr lang="ru-RU" sz="2800" dirty="0" smtClean="0">
-                <a:solidFill>
-                  <a:schemeClr val="bg1"/>
-                </a:solidFill>
-              </a:rPr>
-              <a:t>Сертификат об окончании курса</a:t>
-            </a:r>
-          </a:p>
-          <a:p>
-            <a:pPr marL="742950" lvl="1" indent="-285750">
-              <a:buFont typeface="Arial" pitchFamily="34" charset="0"/>
-              <a:buChar char="•"/>
-            </a:pPr>
-            <a:r>
-              <a:rPr lang="ru-RU" sz="2800" dirty="0" smtClean="0">
-                <a:solidFill>
-                  <a:schemeClr val="bg1"/>
-                </a:solidFill>
-              </a:rPr>
-              <a:t>Необходимо</a:t>
-            </a:r>
-            <a:r>
-              <a:rPr lang="ru-RU" sz="2800" dirty="0" smtClean="0">
-                <a:solidFill>
-                  <a:schemeClr val="bg1"/>
-                </a:solidFill>
-              </a:rPr>
-              <a:t>:</a:t>
-            </a:r>
-          </a:p>
-          <a:p>
-            <a:pPr marL="1200150" lvl="2" indent="-285750">
-              <a:buFont typeface="Arial" pitchFamily="34" charset="0"/>
-              <a:buChar char="•"/>
-            </a:pPr>
-            <a:r>
-              <a:rPr lang="ru-RU" sz="2800" dirty="0" smtClean="0">
-                <a:solidFill>
-                  <a:schemeClr val="bg1"/>
-                </a:solidFill>
-              </a:rPr>
-              <a:t>Посетить не менее 80% занятий</a:t>
-            </a:r>
-          </a:p>
-          <a:p>
-            <a:pPr marL="1200150" lvl="2" indent="-285750">
-              <a:buFont typeface="Arial" pitchFamily="34" charset="0"/>
-              <a:buChar char="•"/>
-            </a:pPr>
-            <a:r>
-              <a:rPr lang="ru-RU" sz="2800" dirty="0" smtClean="0">
-                <a:solidFill>
-                  <a:schemeClr val="bg1"/>
-                </a:solidFill>
-              </a:rPr>
-              <a:t>Выполнять домашние работы</a:t>
-            </a:r>
-          </a:p>
-          <a:p>
-            <a:pPr marL="1200150" lvl="2" indent="-285750">
-              <a:buFont typeface="Arial" pitchFamily="34" charset="0"/>
-              <a:buChar char="•"/>
-            </a:pPr>
-            <a:r>
-              <a:rPr lang="ru-RU" sz="2800" dirty="0" smtClean="0">
-                <a:solidFill>
-                  <a:schemeClr val="bg1"/>
-                </a:solidFill>
-              </a:rPr>
-              <a:t>Завершить итоговый проект</a:t>
-            </a:r>
-            <a:endParaRPr lang="en-US" sz="2800" dirty="0">
-              <a:solidFill>
-                <a:schemeClr val="bg1"/>
-              </a:solidFill>
-            </a:endParaRPr>
+          <a:lstStyle>
+            <a:lvl1pPr algn="ctr" defTabSz="914400" rtl="0" eaLnBrk="1" latinLnBrk="0" hangingPunct="1">
+              <a:spcBef>
+                <a:spcPct val="0"/>
+              </a:spcBef>
+              <a:buNone/>
+              <a:defRPr sz="4400" kern="1200">
+                <a:solidFill>
+                  <a:schemeClr val="tx1"/>
+                </a:solidFill>
+                <a:latin typeface="+mj-lt"/>
+                <a:ea typeface="+mj-ea"/>
+                <a:cs typeface="+mj-cs"/>
+              </a:defRPr>
+            </a:lvl1pPr>
+          </a:lstStyle>
+          <a:p>
+            <a:r>
+              <a:rPr lang="en-US" dirty="0" smtClean="0"/>
+              <a:t>email@me.name</a:t>
+            </a:r>
+            <a:endParaRPr lang="ru-RU" dirty="0"/>
           </a:p>
         </p:txBody>
       </p:sp>
     </p:spTree>
     <p:extLst>
       <p:ext uri="{BB962C8B-B14F-4D97-AF65-F5344CB8AC3E}">
-        <p14:creationId xmlns:p14="http://schemas.microsoft.com/office/powerpoint/2010/main" val="1086215874"/>
+        <p14:creationId xmlns:p14="http://schemas.microsoft.com/office/powerpoint/2010/main" val="1805584238"/>
       </p:ext>
     </p:extLst>
   </p:cSld>
@@ -3909,8 +3711,8 @@
         </p:nvSpPr>
         <p:spPr>
           <a:xfrm>
-            <a:off x="251520" y="3013502"/>
-            <a:ext cx="8640960" cy="830997"/>
+            <a:off x="251520" y="188640"/>
+            <a:ext cx="8640960" cy="769441"/>
           </a:xfrm>
           <a:prstGeom prst="rect">
             <a:avLst/>
@@ -3924,14 +3726,14 @@
           <a:p>
             <a:pPr lvl="0" algn="ctr"/>
             <a:r>
-              <a:rPr lang="ru-RU" sz="4800" dirty="0" smtClean="0">
+              <a:rPr lang="ru-RU" sz="4400" dirty="0" smtClean="0">
                 <a:solidFill>
                   <a:schemeClr val="bg1"/>
                 </a:solidFill>
               </a:rPr>
-              <a:t>Что ожидать от данного курса?</a:t>
-            </a:r>
-            <a:endParaRPr lang="ru-RU" sz="4800" dirty="0">
+              <a:t>Организационные вопросы</a:t>
+            </a:r>
+            <a:endParaRPr lang="en-US" sz="4400" dirty="0">
               <a:solidFill>
                 <a:schemeClr val="bg1"/>
               </a:solidFill>
@@ -3939,10 +3741,210 @@
           </a:p>
         </p:txBody>
       </p:sp>
+      <p:sp>
+        <p:nvSpPr>
+          <p:cNvPr id="2" name="TextBox 1"/>
+          <p:cNvSpPr txBox="1"/>
+          <p:nvPr/>
+        </p:nvSpPr>
+        <p:spPr>
+          <a:xfrm>
+            <a:off x="251520" y="1052736"/>
+            <a:ext cx="8640960" cy="3108543"/>
+          </a:xfrm>
+          <a:prstGeom prst="rect">
+            <a:avLst/>
+          </a:prstGeom>
+          <a:noFill/>
+        </p:spPr>
+        <p:txBody>
+          <a:bodyPr wrap="square" rtlCol="0">
+            <a:spAutoFit/>
+          </a:bodyPr>
+          <a:lstStyle/>
+          <a:p>
+            <a:pPr marL="285750" indent="-285750">
+              <a:buFont typeface="Arial" pitchFamily="34" charset="0"/>
+              <a:buChar char="•"/>
+            </a:pPr>
+            <a:r>
+              <a:rPr lang="ru-RU" sz="2800" dirty="0">
+                <a:solidFill>
+                  <a:schemeClr val="bg1"/>
+                </a:solidFill>
+              </a:rPr>
+              <a:t>Начало </a:t>
+            </a:r>
+            <a:r>
+              <a:rPr lang="ru-RU" sz="2800" dirty="0" smtClean="0">
+                <a:solidFill>
+                  <a:schemeClr val="bg1"/>
+                </a:solidFill>
+              </a:rPr>
+              <a:t>занятий</a:t>
+            </a:r>
+            <a:r>
+              <a:rPr lang="en-US" sz="2800" dirty="0">
+                <a:solidFill>
+                  <a:schemeClr val="bg1"/>
+                </a:solidFill>
+              </a:rPr>
+              <a:t> </a:t>
+            </a:r>
+            <a:r>
+              <a:rPr lang="en-US" sz="2800" dirty="0" smtClean="0">
+                <a:solidFill>
+                  <a:schemeClr val="bg1"/>
+                </a:solidFill>
+              </a:rPr>
+              <a:t>– </a:t>
+            </a:r>
+            <a:r>
+              <a:rPr lang="ru-RU" sz="2800" dirty="0" smtClean="0">
+                <a:solidFill>
+                  <a:schemeClr val="bg1"/>
+                </a:solidFill>
+              </a:rPr>
+              <a:t>19:00, один 5 мин. перерыв</a:t>
+            </a:r>
+            <a:endParaRPr lang="ru-RU" sz="2800" dirty="0" smtClean="0">
+              <a:solidFill>
+                <a:schemeClr val="bg1"/>
+              </a:solidFill>
+            </a:endParaRPr>
+          </a:p>
+          <a:p>
+            <a:pPr marL="285750" indent="-285750">
+              <a:buFont typeface="Arial" pitchFamily="34" charset="0"/>
+              <a:buChar char="•"/>
+            </a:pPr>
+            <a:r>
+              <a:rPr lang="ru-RU" sz="2800" dirty="0" smtClean="0">
+                <a:solidFill>
+                  <a:schemeClr val="bg1"/>
+                </a:solidFill>
+              </a:rPr>
+              <a:t>Домашняя </a:t>
+            </a:r>
+            <a:r>
+              <a:rPr lang="ru-RU" sz="2800" dirty="0" smtClean="0">
+                <a:solidFill>
+                  <a:schemeClr val="bg1"/>
+                </a:solidFill>
+              </a:rPr>
+              <a:t>работа</a:t>
+            </a:r>
+          </a:p>
+          <a:p>
+            <a:pPr marL="285750" indent="-285750">
+              <a:buFont typeface="Arial" pitchFamily="34" charset="0"/>
+              <a:buChar char="•"/>
+            </a:pPr>
+            <a:r>
+              <a:rPr lang="ru-RU" sz="2800" dirty="0" smtClean="0">
+                <a:solidFill>
+                  <a:schemeClr val="bg1"/>
+                </a:solidFill>
+              </a:rPr>
+              <a:t>Сертификат </a:t>
+            </a:r>
+            <a:r>
+              <a:rPr lang="ru-RU" sz="2800" dirty="0" smtClean="0">
+                <a:solidFill>
+                  <a:schemeClr val="bg1"/>
+                </a:solidFill>
+              </a:rPr>
+              <a:t>об окончании курса</a:t>
+            </a:r>
+          </a:p>
+          <a:p>
+            <a:pPr marL="742950" lvl="1" indent="-285750">
+              <a:buFont typeface="Arial" pitchFamily="34" charset="0"/>
+              <a:buChar char="•"/>
+            </a:pPr>
+            <a:r>
+              <a:rPr lang="ru-RU" sz="2800" dirty="0" smtClean="0">
+                <a:solidFill>
+                  <a:schemeClr val="bg1"/>
+                </a:solidFill>
+              </a:rPr>
+              <a:t>Необходимо:</a:t>
+            </a:r>
+          </a:p>
+          <a:p>
+            <a:pPr marL="1200150" lvl="2" indent="-285750">
+              <a:buFont typeface="Arial" pitchFamily="34" charset="0"/>
+              <a:buChar char="•"/>
+            </a:pPr>
+            <a:r>
+              <a:rPr lang="ru-RU" sz="2800" dirty="0" smtClean="0">
+                <a:solidFill>
+                  <a:schemeClr val="bg1"/>
+                </a:solidFill>
+              </a:rPr>
+              <a:t>Посетить не менее 80% </a:t>
+            </a:r>
+            <a:r>
+              <a:rPr lang="ru-RU" sz="2800" dirty="0" smtClean="0">
+                <a:solidFill>
+                  <a:schemeClr val="bg1"/>
+                </a:solidFill>
+              </a:rPr>
+              <a:t>занятий</a:t>
+            </a:r>
+            <a:endParaRPr lang="ru-RU" sz="2800" dirty="0" smtClean="0">
+              <a:solidFill>
+                <a:schemeClr val="bg1"/>
+              </a:solidFill>
+            </a:endParaRPr>
+          </a:p>
+          <a:p>
+            <a:pPr marL="1200150" lvl="2" indent="-285750">
+              <a:buFont typeface="Arial" pitchFamily="34" charset="0"/>
+              <a:buChar char="•"/>
+            </a:pPr>
+            <a:r>
+              <a:rPr lang="ru-RU" sz="2800" dirty="0" smtClean="0">
+                <a:solidFill>
+                  <a:schemeClr val="bg1"/>
+                </a:solidFill>
+              </a:rPr>
+              <a:t>Завершить итоговый </a:t>
+            </a:r>
+            <a:r>
+              <a:rPr lang="ru-RU" sz="2800" dirty="0" smtClean="0">
+                <a:solidFill>
+                  <a:schemeClr val="bg1"/>
+                </a:solidFill>
+              </a:rPr>
+              <a:t>проект</a:t>
+            </a:r>
+          </a:p>
+          <a:p>
+            <a:pPr marL="285750" indent="-285750">
+              <a:buFont typeface="Arial" pitchFamily="34" charset="0"/>
+              <a:buChar char="•"/>
+            </a:pPr>
+            <a:r>
+              <a:rPr lang="ru-RU" sz="2800" dirty="0" smtClean="0">
+                <a:solidFill>
+                  <a:schemeClr val="bg1"/>
+                </a:solidFill>
+              </a:rPr>
+              <a:t>Анкета качества</a:t>
+            </a:r>
+            <a:endParaRPr lang="en-US" sz="2800" dirty="0">
+              <a:solidFill>
+                <a:schemeClr val="bg1"/>
+              </a:solidFill>
+            </a:endParaRPr>
+          </a:p>
+        </p:txBody>
+      </p:sp>
     </p:spTree>
     <p:extLst>
       <p:ext uri="{BB962C8B-B14F-4D97-AF65-F5344CB8AC3E}">
-        <p14:creationId xmlns:p14="http://schemas.microsoft.com/office/powerpoint/2010/main" val="951556230"/>
+        <p14:creationId xmlns:p14="http://schemas.microsoft.com/office/powerpoint/2010/main" val="1086215874"/>
       </p:ext>
     </p:extLst>
   </p:cSld>
@@ -3984,6 +3986,81 @@
         </p:nvSpPr>
         <p:spPr>
           <a:xfrm>
+            <a:off x="251520" y="3013502"/>
+            <a:ext cx="8640960" cy="830997"/>
+          </a:xfrm>
+          <a:prstGeom prst="rect">
+            <a:avLst/>
+          </a:prstGeom>
+        </p:spPr>
+        <p:txBody>
+          <a:bodyPr wrap="square">
+            <a:spAutoFit/>
+          </a:bodyPr>
+          <a:lstStyle/>
+          <a:p>
+            <a:pPr lvl="0" algn="ctr"/>
+            <a:r>
+              <a:rPr lang="ru-RU" sz="4800" dirty="0" smtClean="0">
+                <a:solidFill>
+                  <a:schemeClr val="bg1"/>
+                </a:solidFill>
+              </a:rPr>
+              <a:t>Что ожидать от данного курса?</a:t>
+            </a:r>
+            <a:endParaRPr lang="ru-RU" sz="4800" dirty="0">
+              <a:solidFill>
+                <a:schemeClr val="bg1"/>
+              </a:solidFill>
+            </a:endParaRPr>
+          </a:p>
+        </p:txBody>
+      </p:sp>
+    </p:spTree>
+    <p:extLst>
+      <p:ext uri="{BB962C8B-B14F-4D97-AF65-F5344CB8AC3E}">
+        <p14:creationId xmlns:p14="http://schemas.microsoft.com/office/powerpoint/2010/main" val="951556230"/>
+      </p:ext>
+    </p:extLst>
+  </p:cSld>
+  <p:clrMapOvr>
+    <a:masterClrMapping/>
+  </p:clrMapOvr>
+  <p:timing>
+    <p:tnLst>
+      <p:par>
+        <p:cTn id="1" dur="indefinite" restart="never" nodeType="tmRoot"/>
+      </p:par>
+    </p:tnLst>
+  </p:timing>
+</p:sld>
+</file>
+
+<file path=ppt/slides/slide6.xml><?xml version="1.0" encoding="utf-8"?>
+<p:sld xmlns:a="http://schemas.openxmlformats.org/drawingml/2006/main" xmlns:r="http://schemas.openxmlformats.org/officeDocument/2006/relationships" xmlns:p="http://schemas.openxmlformats.org/presentationml/2006/main">
+  <p:cSld>
+    <p:spTree>
+      <p:nvGrpSpPr>
+        <p:cNvPr id="1" name=""/>
+        <p:cNvGrpSpPr/>
+        <p:nvPr/>
+      </p:nvGrpSpPr>
+      <p:grpSpPr>
+        <a:xfrm>
+          <a:off x="0" y="0"/>
+          <a:ext cx="0" cy="0"/>
+          <a:chOff x="0" y="0"/>
+          <a:chExt cx="0" cy="0"/>
+        </a:xfrm>
+      </p:grpSpPr>
+      <p:sp>
+        <p:nvSpPr>
+          <p:cNvPr id="3" name="Rectangle 2"/>
+          <p:cNvSpPr/>
+          <p:nvPr/>
+        </p:nvSpPr>
+        <p:spPr>
+          <a:xfrm>
             <a:off x="226765" y="1124744"/>
             <a:ext cx="8640960" cy="1077218"/>
           </a:xfrm>
@@ -4123,7 +4200,7 @@
 </p:sld>
 </file>
 
-<file path=ppt/slides/slide6.xml><?xml version="1.0" encoding="utf-8"?>
+<file path=ppt/slides/slide7.xml><?xml version="1.0" encoding="utf-8"?>
 <p:sld xmlns:a="http://schemas.openxmlformats.org/drawingml/2006/main" xmlns:r="http://schemas.openxmlformats.org/officeDocument/2006/relationships" xmlns:p="http://schemas.openxmlformats.org/presentationml/2006/main">
   <p:cSld>
     <p:spTree>

</xml_diff>

<commit_message>
Added links to programming puzzles
</commit_message>
<xml_diff>
--- a/Presentation/intro.pptx
+++ b/Presentation/intro.pptx
@@ -5,7 +5,7 @@
     <p:sldMasterId id="2147483648" r:id="rId1"/>
   </p:sldMasterIdLst>
   <p:notesMasterIdLst>
-    <p:notesMasterId r:id="rId9"/>
+    <p:notesMasterId r:id="rId10"/>
   </p:notesMasterIdLst>
   <p:sldIdLst>
     <p:sldId id="257" r:id="rId2"/>
@@ -15,6 +15,7 @@
     <p:sldId id="262" r:id="rId6"/>
     <p:sldId id="259" r:id="rId7"/>
     <p:sldId id="263" r:id="rId8"/>
+    <p:sldId id="266" r:id="rId9"/>
   </p:sldIdLst>
   <p:sldSz cx="9144000" cy="6858000" type="screen4x3"/>
   <p:notesSz cx="6858000" cy="9144000"/>
@@ -198,7 +199,7 @@
           <a:p>
             <a:fld id="{B24A7054-7FFB-49F4-A126-5DF6E687FF53}" type="datetimeFigureOut">
               <a:rPr lang="ru-RU" smtClean="0"/>
-              <a:t>05.01.2013</a:t>
+              <a:t>07.02.2013</a:t>
             </a:fld>
             <a:endParaRPr lang="ru-RU"/>
           </a:p>
@@ -1480,7 +1481,7 @@
           <a:p>
             <a:fld id="{8E6E6A2A-E9D3-4A0D-B04A-ABDD367A1E08}" type="datetimeFigureOut">
               <a:rPr lang="ru-RU" smtClean="0"/>
-              <a:t>05.01.2013</a:t>
+              <a:t>07.02.2013</a:t>
             </a:fld>
             <a:endParaRPr lang="ru-RU"/>
           </a:p>
@@ -2925,7 +2926,7 @@
           <a:p>
             <a:fld id="{AC3D3127-B7C4-45E3-9797-C527EC9FDD78}" type="datetimeFigureOut">
               <a:rPr lang="ru-RU" smtClean="0"/>
-              <a:t>05.01.2013</a:t>
+              <a:t>07.02.2013</a:t>
             </a:fld>
             <a:endParaRPr lang="ru-RU"/>
           </a:p>
@@ -3807,11 +3808,6 @@
               </a:rPr>
               <a:t>19:00, один 5 мин. перерыв</a:t>
             </a:r>
-            <a:endParaRPr lang="ru-RU" sz="2800" dirty="0" smtClean="0">
-              <a:solidFill>
-                <a:schemeClr val="bg1"/>
-              </a:solidFill>
-            </a:endParaRPr>
           </a:p>
           <a:p>
             <a:pPr marL="285750" indent="-285750">
@@ -3824,15 +3820,7 @@
                   <a:schemeClr val="bg1"/>
                 </a:solidFill>
               </a:rPr>
-              <a:t>Домашняя </a:t>
-            </a:r>
-            <a:r>
-              <a:rPr lang="ru-RU" sz="2800" dirty="0" smtClean="0">
-                <a:solidFill>
-                  <a:schemeClr val="bg1"/>
-                </a:solidFill>
-              </a:rPr>
-              <a:t>работа</a:t>
+              <a:t>Домашняя работа</a:t>
             </a:r>
           </a:p>
           <a:p>
@@ -3846,15 +3834,7 @@
                   <a:schemeClr val="bg1"/>
                 </a:solidFill>
               </a:rPr>
-              <a:t>Сертификат </a:t>
-            </a:r>
-            <a:r>
-              <a:rPr lang="ru-RU" sz="2800" dirty="0" smtClean="0">
-                <a:solidFill>
-                  <a:schemeClr val="bg1"/>
-                </a:solidFill>
-              </a:rPr>
-              <a:t>об окончании курса</a:t>
+              <a:t>Сертификат об окончании курса</a:t>
             </a:r>
           </a:p>
           <a:p>
@@ -3882,21 +3862,8 @@
                   <a:schemeClr val="bg1"/>
                 </a:solidFill>
               </a:rPr>
-              <a:t>Посетить не менее 80% </a:t>
-            </a:r>
-            <a:r>
-              <a:rPr lang="ru-RU" sz="2800" dirty="0" smtClean="0">
-                <a:solidFill>
-                  <a:schemeClr val="bg1"/>
-                </a:solidFill>
-              </a:rPr>
-              <a:t>занятий</a:t>
-            </a:r>
-            <a:endParaRPr lang="ru-RU" sz="2800" dirty="0" smtClean="0">
-              <a:solidFill>
-                <a:schemeClr val="bg1"/>
-              </a:solidFill>
-            </a:endParaRPr>
+              <a:t>Посетить не менее 80% занятий</a:t>
+            </a:r>
           </a:p>
           <a:p>
             <a:pPr marL="1200150" lvl="2" indent="-285750">
@@ -3909,15 +3876,7 @@
                   <a:schemeClr val="bg1"/>
                 </a:solidFill>
               </a:rPr>
-              <a:t>Завершить итоговый </a:t>
-            </a:r>
-            <a:r>
-              <a:rPr lang="ru-RU" sz="2800" dirty="0" smtClean="0">
-                <a:solidFill>
-                  <a:schemeClr val="bg1"/>
-                </a:solidFill>
-              </a:rPr>
-              <a:t>проект</a:t>
+              <a:t>Завершить итоговый проект</a:t>
             </a:r>
           </a:p>
           <a:p>
@@ -4345,6 +4304,136 @@
     <p:extLst>
       <p:ext uri="{BB962C8B-B14F-4D97-AF65-F5344CB8AC3E}">
         <p14:creationId xmlns:p14="http://schemas.microsoft.com/office/powerpoint/2010/main" val="1514770362"/>
+      </p:ext>
+    </p:extLst>
+  </p:cSld>
+  <p:clrMapOvr>
+    <a:masterClrMapping/>
+  </p:clrMapOvr>
+  <p:timing>
+    <p:tnLst>
+      <p:par>
+        <p:cTn id="1" dur="indefinite" restart="never" nodeType="tmRoot"/>
+      </p:par>
+    </p:tnLst>
+  </p:timing>
+</p:sld>
+</file>
+
+<file path=ppt/slides/slide8.xml><?xml version="1.0" encoding="utf-8"?>
+<p:sld xmlns:a="http://schemas.openxmlformats.org/drawingml/2006/main" xmlns:r="http://schemas.openxmlformats.org/officeDocument/2006/relationships" xmlns:p="http://schemas.openxmlformats.org/presentationml/2006/main">
+  <p:cSld>
+    <p:spTree>
+      <p:nvGrpSpPr>
+        <p:cNvPr id="1" name=""/>
+        <p:cNvGrpSpPr/>
+        <p:nvPr/>
+      </p:nvGrpSpPr>
+      <p:grpSpPr>
+        <a:xfrm>
+          <a:off x="0" y="0"/>
+          <a:ext cx="0" cy="0"/>
+          <a:chOff x="0" y="0"/>
+          <a:chExt cx="0" cy="0"/>
+        </a:xfrm>
+      </p:grpSpPr>
+      <p:sp>
+        <p:nvSpPr>
+          <p:cNvPr id="3" name="Content Placeholder 2"/>
+          <p:cNvSpPr>
+            <a:spLocks noGrp="1"/>
+          </p:cNvSpPr>
+          <p:nvPr>
+            <p:ph idx="1"/>
+          </p:nvPr>
+        </p:nvSpPr>
+        <p:spPr>
+          <a:xfrm>
+            <a:off x="457200" y="764704"/>
+            <a:ext cx="8229600" cy="5361459"/>
+          </a:xfrm>
+        </p:spPr>
+        <p:txBody>
+          <a:bodyPr>
+            <a:normAutofit/>
+          </a:bodyPr>
+          <a:lstStyle/>
+          <a:p>
+            <a:r>
+              <a:rPr lang="ru-RU" dirty="0" smtClean="0">
+                <a:solidFill>
+                  <a:schemeClr val="bg1"/>
+                </a:solidFill>
+              </a:rPr>
+              <a:t>Задачи по программированию</a:t>
+            </a:r>
+          </a:p>
+          <a:p>
+            <a:pPr lvl="1"/>
+            <a:r>
+              <a:rPr lang="en-US" dirty="0">
+                <a:solidFill>
+                  <a:schemeClr val="bg1"/>
+                </a:solidFill>
+                <a:hlinkClick r:id="rId2"/>
+              </a:rPr>
+              <a:t>http://projecteuler.net</a:t>
+            </a:r>
+            <a:r>
+              <a:rPr lang="en-US" dirty="0" smtClean="0">
+                <a:solidFill>
+                  <a:schemeClr val="bg1"/>
+                </a:solidFill>
+                <a:hlinkClick r:id="rId2"/>
+              </a:rPr>
+              <a:t>/</a:t>
+            </a:r>
+            <a:endParaRPr lang="ru-RU" dirty="0" smtClean="0">
+              <a:solidFill>
+                <a:schemeClr val="bg1"/>
+              </a:solidFill>
+            </a:endParaRPr>
+          </a:p>
+          <a:p>
+            <a:pPr lvl="1"/>
+            <a:r>
+              <a:rPr lang="en-US" dirty="0">
+                <a:solidFill>
+                  <a:schemeClr val="bg1"/>
+                </a:solidFill>
+                <a:hlinkClick r:id="rId3"/>
+              </a:rPr>
+              <a:t>http://www.pex4fun.com</a:t>
+            </a:r>
+            <a:r>
+              <a:rPr lang="en-US" dirty="0" smtClean="0">
+                <a:solidFill>
+                  <a:schemeClr val="bg1"/>
+                </a:solidFill>
+                <a:hlinkClick r:id="rId3"/>
+              </a:rPr>
+              <a:t>/</a:t>
+            </a:r>
+            <a:endParaRPr lang="ru-RU" dirty="0" smtClean="0">
+              <a:solidFill>
+                <a:schemeClr val="bg1"/>
+              </a:solidFill>
+            </a:endParaRPr>
+          </a:p>
+          <a:p>
+            <a:pPr lvl="1"/>
+            <a:endParaRPr lang="en-US" dirty="0">
+              <a:solidFill>
+                <a:schemeClr val="bg1"/>
+              </a:solidFill>
+            </a:endParaRPr>
+          </a:p>
+        </p:txBody>
+      </p:sp>
+    </p:spTree>
+    <p:extLst>
+      <p:ext uri="{BB962C8B-B14F-4D97-AF65-F5344CB8AC3E}">
+        <p14:creationId xmlns:p14="http://schemas.microsoft.com/office/powerpoint/2010/main" val="3732031494"/>
       </p:ext>
     </p:extLst>
   </p:cSld>

</xml_diff>

<commit_message>
Added slide with links to personal sites to each presentation
</commit_message>
<xml_diff>
--- a/Presentation/intro.pptx
+++ b/Presentation/intro.pptx
@@ -12,8 +12,8 @@
     <p:sldId id="265" r:id="rId3"/>
     <p:sldId id="264" r:id="rId4"/>
     <p:sldId id="261" r:id="rId5"/>
-    <p:sldId id="262" r:id="rId6"/>
-    <p:sldId id="259" r:id="rId7"/>
+    <p:sldId id="267" r:id="rId6"/>
+    <p:sldId id="262" r:id="rId7"/>
     <p:sldId id="263" r:id="rId8"/>
     <p:sldId id="266" r:id="rId9"/>
   </p:sldIdLst>
@@ -199,7 +199,7 @@
           <a:p>
             <a:fld id="{B24A7054-7FFB-49F4-A126-5DF6E687FF53}" type="datetimeFigureOut">
               <a:rPr lang="ru-RU" smtClean="0"/>
-              <a:t>07.02.2013</a:t>
+              <a:t>27.03.2013</a:t>
             </a:fld>
             <a:endParaRPr lang="ru-RU"/>
           </a:p>
@@ -1481,7 +1481,7 @@
           <a:p>
             <a:fld id="{8E6E6A2A-E9D3-4A0D-B04A-ABDD367A1E08}" type="datetimeFigureOut">
               <a:rPr lang="ru-RU" smtClean="0"/>
-              <a:t>07.02.2013</a:t>
+              <a:t>27.03.2013</a:t>
             </a:fld>
             <a:endParaRPr lang="ru-RU"/>
           </a:p>
@@ -2926,7 +2926,7 @@
           <a:p>
             <a:fld id="{AC3D3127-B7C4-45E3-9797-C527EC9FDD78}" type="datetimeFigureOut">
               <a:rPr lang="ru-RU" smtClean="0"/>
-              <a:t>07.02.2013</a:t>
+              <a:t>27.03.2013</a:t>
             </a:fld>
             <a:endParaRPr lang="ru-RU"/>
           </a:p>
@@ -3939,35 +3939,28 @@
       </p:grpSpPr>
       <p:sp>
         <p:nvSpPr>
-          <p:cNvPr id="3" name="Rectangle 2"/>
-          <p:cNvSpPr/>
-          <p:nvPr/>
-        </p:nvSpPr>
-        <p:spPr>
-          <a:xfrm>
-            <a:off x="251520" y="3013502"/>
-            <a:ext cx="8640960" cy="830997"/>
-          </a:xfrm>
-          <a:prstGeom prst="rect">
-            <a:avLst/>
-          </a:prstGeom>
-        </p:spPr>
-        <p:txBody>
-          <a:bodyPr wrap="square">
-            <a:spAutoFit/>
-          </a:bodyPr>
+          <p:cNvPr id="2" name="Title 1"/>
+          <p:cNvSpPr>
+            <a:spLocks noGrp="1"/>
+          </p:cNvSpPr>
+          <p:nvPr>
+            <p:ph type="title"/>
+          </p:nvPr>
+        </p:nvSpPr>
+        <p:spPr/>
+        <p:txBody>
+          <a:bodyPr/>
           <a:lstStyle/>
           <a:p>
-            <a:pPr lvl="0" algn="ctr"/>
-            <a:r>
-              <a:rPr lang="ru-RU" sz="4800" dirty="0" smtClean="0">
+            <a:r>
+              <a:rPr lang="ru-RU" dirty="0">
                 <a:solidFill>
                   <a:schemeClr val="bg1"/>
                 </a:solidFill>
               </a:rPr>
-              <a:t>Что ожидать от данного курса?</a:t>
-            </a:r>
-            <a:endParaRPr lang="ru-RU" sz="4800" dirty="0">
+              <a:t>Материалы для обучения</a:t>
+            </a:r>
+            <a:endParaRPr lang="en-US" dirty="0">
               <a:solidFill>
                 <a:schemeClr val="bg1"/>
               </a:solidFill>
@@ -3975,23 +3968,133 @@
           </a:p>
         </p:txBody>
       </p:sp>
+      <p:sp>
+        <p:nvSpPr>
+          <p:cNvPr id="3" name="Content Placeholder 2"/>
+          <p:cNvSpPr>
+            <a:spLocks noGrp="1"/>
+          </p:cNvSpPr>
+          <p:nvPr>
+            <p:ph idx="1"/>
+          </p:nvPr>
+        </p:nvSpPr>
+        <p:spPr/>
+        <p:txBody>
+          <a:bodyPr/>
+          <a:lstStyle/>
+          <a:p>
+            <a:r>
+              <a:rPr lang="en-US" dirty="0">
+                <a:solidFill>
+                  <a:schemeClr val="bg1"/>
+                </a:solidFill>
+                <a:hlinkClick r:id="rId2"/>
+              </a:rPr>
+              <a:t>https://</a:t>
+            </a:r>
+            <a:r>
+              <a:rPr lang="en-US" dirty="0" smtClean="0">
+                <a:solidFill>
+                  <a:schemeClr val="bg1"/>
+                </a:solidFill>
+                <a:hlinkClick r:id="rId2"/>
+              </a:rPr>
+              <a:t>github.com/bazile/Training</a:t>
+            </a:r>
+            <a:r>
+              <a:rPr lang="en-US" dirty="0" smtClean="0">
+                <a:solidFill>
+                  <a:schemeClr val="bg1"/>
+                </a:solidFill>
+              </a:rPr>
+              <a:t/>
+            </a:r>
+            <a:br>
+              <a:rPr lang="en-US" dirty="0" smtClean="0">
+                <a:solidFill>
+                  <a:schemeClr val="bg1"/>
+                </a:solidFill>
+              </a:rPr>
+            </a:br>
+            <a:r>
+              <a:rPr lang="ru-RU" dirty="0" smtClean="0">
+                <a:solidFill>
+                  <a:schemeClr val="bg1"/>
+                </a:solidFill>
+              </a:rPr>
+              <a:t>Презентации и примеры кода используемые во время занятия</a:t>
+            </a:r>
+          </a:p>
+          <a:p>
+            <a:endParaRPr lang="ru-RU" dirty="0" smtClean="0">
+              <a:solidFill>
+                <a:schemeClr val="bg1"/>
+              </a:solidFill>
+            </a:endParaRPr>
+          </a:p>
+          <a:p>
+            <a:r>
+              <a:rPr lang="en-US" dirty="0">
+                <a:solidFill>
+                  <a:schemeClr val="bg1"/>
+                </a:solidFill>
+                <a:hlinkClick r:id="rId3"/>
+              </a:rPr>
+              <a:t>http://belhard.nullptr.ru</a:t>
+            </a:r>
+            <a:r>
+              <a:rPr lang="en-US" dirty="0" smtClean="0">
+                <a:solidFill>
+                  <a:schemeClr val="bg1"/>
+                </a:solidFill>
+                <a:hlinkClick r:id="rId3"/>
+              </a:rPr>
+              <a:t>/</a:t>
+            </a:r>
+            <a:r>
+              <a:rPr lang="ru-RU" dirty="0" smtClean="0">
+                <a:solidFill>
+                  <a:schemeClr val="bg1"/>
+                </a:solidFill>
+              </a:rPr>
+              <a:t/>
+            </a:r>
+            <a:br>
+              <a:rPr lang="ru-RU" dirty="0" smtClean="0">
+                <a:solidFill>
+                  <a:schemeClr val="bg1"/>
+                </a:solidFill>
+              </a:rPr>
+            </a:br>
+            <a:r>
+              <a:rPr lang="ru-RU" dirty="0" smtClean="0">
+                <a:solidFill>
+                  <a:schemeClr val="bg1"/>
+                </a:solidFill>
+              </a:rPr>
+              <a:t>Книги, примеры к ним и другие полезные файлы.</a:t>
+            </a:r>
+            <a:endParaRPr lang="ru-RU" dirty="0">
+              <a:solidFill>
+                <a:schemeClr val="bg1"/>
+              </a:solidFill>
+            </a:endParaRPr>
+          </a:p>
+          <a:p>
+            <a:endParaRPr lang="en-US" dirty="0"/>
+          </a:p>
+        </p:txBody>
+      </p:sp>
     </p:spTree>
     <p:extLst>
       <p:ext uri="{BB962C8B-B14F-4D97-AF65-F5344CB8AC3E}">
-        <p14:creationId xmlns:p14="http://schemas.microsoft.com/office/powerpoint/2010/main" val="951556230"/>
+        <p14:creationId xmlns:p14="http://schemas.microsoft.com/office/powerpoint/2010/main" val="1430733616"/>
       </p:ext>
     </p:extLst>
   </p:cSld>
   <p:clrMapOvr>
     <a:masterClrMapping/>
   </p:clrMapOvr>
-  <p:timing>
-    <p:tnLst>
-      <p:par>
-        <p:cTn id="1" dur="indefinite" restart="never" nodeType="tmRoot"/>
-      </p:par>
-    </p:tnLst>
-  </p:timing>
 </p:sld>
 </file>
 
@@ -4020,8 +4123,8 @@
         </p:nvSpPr>
         <p:spPr>
           <a:xfrm>
-            <a:off x="226765" y="1124744"/>
-            <a:ext cx="8640960" cy="1077218"/>
+            <a:off x="251520" y="3013502"/>
+            <a:ext cx="8640960" cy="830997"/>
           </a:xfrm>
           <a:prstGeom prst="rect">
             <a:avLst/>
@@ -4033,116 +4136,27 @@
           </a:bodyPr>
           <a:lstStyle/>
           <a:p>
-            <a:pPr marL="457200" lvl="0" indent="-457200">
-              <a:buFont typeface="Arial" pitchFamily="34" charset="0"/>
-              <a:buChar char="•"/>
-            </a:pPr>
-            <a:r>
-              <a:rPr lang="en-US" sz="3200" dirty="0">
+            <a:pPr lvl="0" algn="ctr"/>
+            <a:r>
+              <a:rPr lang="ru-RU" sz="4800" dirty="0" smtClean="0">
                 <a:solidFill>
                   <a:schemeClr val="bg1"/>
                 </a:solidFill>
-                <a:hlinkClick r:id="rId2"/>
               </a:rPr>
-              <a:t>https://</a:t>
-            </a:r>
-            <a:r>
-              <a:rPr lang="en-US" sz="3200" dirty="0" smtClean="0">
-                <a:solidFill>
-                  <a:schemeClr val="bg1"/>
-                </a:solidFill>
-                <a:hlinkClick r:id="rId2"/>
-              </a:rPr>
-              <a:t>github.com/bazile/Training</a:t>
-            </a:r>
-            <a:endParaRPr lang="ru-RU" sz="3200" dirty="0" smtClean="0">
+              <a:t>Что ожидать от данного курса?</a:t>
+            </a:r>
+            <a:endParaRPr lang="ru-RU" sz="4800" dirty="0">
               <a:solidFill>
                 <a:schemeClr val="bg1"/>
               </a:solidFill>
             </a:endParaRPr>
           </a:p>
-          <a:p>
-            <a:pPr marL="457200" lvl="0" indent="-457200">
-              <a:buFont typeface="Arial" pitchFamily="34" charset="0"/>
-              <a:buChar char="•"/>
-            </a:pPr>
-            <a:r>
-              <a:rPr lang="en-US" sz="3200" dirty="0" smtClean="0">
-                <a:solidFill>
-                  <a:schemeClr val="bg1"/>
-                </a:solidFill>
-                <a:hlinkClick r:id="rId3"/>
-              </a:rPr>
-              <a:t>http</a:t>
-            </a:r>
-            <a:r>
-              <a:rPr lang="en-US" sz="3200" dirty="0">
-                <a:solidFill>
-                  <a:schemeClr val="bg1"/>
-                </a:solidFill>
-                <a:hlinkClick r:id="rId3"/>
-              </a:rPr>
-              <a:t>://belhard.nullptr.ru</a:t>
-            </a:r>
-            <a:r>
-              <a:rPr lang="en-US" sz="3200" dirty="0" smtClean="0">
-                <a:solidFill>
-                  <a:schemeClr val="bg1"/>
-                </a:solidFill>
-                <a:hlinkClick r:id="rId3"/>
-              </a:rPr>
-              <a:t>/</a:t>
-            </a:r>
-            <a:endParaRPr lang="en-US" sz="3200" dirty="0" smtClean="0">
-              <a:solidFill>
-                <a:schemeClr val="bg1"/>
-              </a:solidFill>
-            </a:endParaRPr>
-          </a:p>
-        </p:txBody>
-      </p:sp>
-      <p:sp>
-        <p:nvSpPr>
-          <p:cNvPr id="4" name="Rectangle 3"/>
-          <p:cNvSpPr/>
-          <p:nvPr/>
-        </p:nvSpPr>
-        <p:spPr>
-          <a:xfrm>
-            <a:off x="251520" y="188640"/>
-            <a:ext cx="8640960" cy="769441"/>
-          </a:xfrm>
-          <a:prstGeom prst="rect">
-            <a:avLst/>
-          </a:prstGeom>
-        </p:spPr>
-        <p:txBody>
-          <a:bodyPr wrap="square">
-            <a:spAutoFit/>
-          </a:bodyPr>
-          <a:lstStyle/>
-          <a:p>
-            <a:pPr lvl="0" algn="ctr"/>
-            <a:r>
-              <a:rPr lang="ru-RU" sz="4400" dirty="0" smtClean="0">
-                <a:solidFill>
-                  <a:schemeClr val="bg1"/>
-                </a:solidFill>
-              </a:rPr>
-              <a:t>Материалы</a:t>
-            </a:r>
-            <a:endParaRPr lang="en-US" sz="4400" dirty="0">
-              <a:solidFill>
-                <a:schemeClr val="bg1"/>
-              </a:solidFill>
-            </a:endParaRPr>
-          </a:p>
         </p:txBody>
       </p:sp>
     </p:spTree>
     <p:extLst>
       <p:ext uri="{BB962C8B-B14F-4D97-AF65-F5344CB8AC3E}">
-        <p14:creationId xmlns:p14="http://schemas.microsoft.com/office/powerpoint/2010/main" val="1418730179"/>
+        <p14:creationId xmlns:p14="http://schemas.microsoft.com/office/powerpoint/2010/main" val="951556230"/>
       </p:ext>
     </p:extLst>
   </p:cSld>

</xml_diff>

<commit_message>
Added link to shared Google docs FAQ
</commit_message>
<xml_diff>
--- a/Presentation/intro.pptx
+++ b/Presentation/intro.pptx
@@ -199,7 +199,7 @@
           <a:p>
             <a:fld id="{B24A7054-7FFB-49F4-A126-5DF6E687FF53}" type="datetimeFigureOut">
               <a:rPr lang="ru-RU" smtClean="0"/>
-              <a:t>27.03.2013</a:t>
+              <a:t>28.03.2013</a:t>
             </a:fld>
             <a:endParaRPr lang="ru-RU"/>
           </a:p>
@@ -1481,7 +1481,7 @@
           <a:p>
             <a:fld id="{8E6E6A2A-E9D3-4A0D-B04A-ABDD367A1E08}" type="datetimeFigureOut">
               <a:rPr lang="ru-RU" smtClean="0"/>
-              <a:t>27.03.2013</a:t>
+              <a:t>28.03.2013</a:t>
             </a:fld>
             <a:endParaRPr lang="ru-RU"/>
           </a:p>
@@ -2926,7 +2926,7 @@
           <a:p>
             <a:fld id="{AC3D3127-B7C4-45E3-9797-C527EC9FDD78}" type="datetimeFigureOut">
               <a:rPr lang="ru-RU" smtClean="0"/>
-              <a:t>27.03.2013</a:t>
+              <a:t>28.03.2013</a:t>
             </a:fld>
             <a:endParaRPr lang="ru-RU"/>
           </a:p>
@@ -3751,7 +3751,7 @@
         <p:spPr>
           <a:xfrm>
             <a:off x="251520" y="1052736"/>
-            <a:ext cx="8640960" cy="3108543"/>
+            <a:ext cx="8640960" cy="4832092"/>
           </a:xfrm>
           <a:prstGeom prst="rect">
             <a:avLst/>
@@ -3890,7 +3890,58 @@
                   <a:schemeClr val="bg1"/>
                 </a:solidFill>
               </a:rPr>
-              <a:t>Анкета качества</a:t>
+              <a:t>Анкета </a:t>
+            </a:r>
+            <a:r>
+              <a:rPr lang="ru-RU" sz="2800" dirty="0" smtClean="0">
+                <a:solidFill>
+                  <a:schemeClr val="bg1"/>
+                </a:solidFill>
+              </a:rPr>
+              <a:t>качества</a:t>
+            </a:r>
+            <a:endParaRPr lang="en-US" sz="2800" dirty="0" smtClean="0">
+              <a:solidFill>
+                <a:schemeClr val="bg1"/>
+              </a:solidFill>
+            </a:endParaRPr>
+          </a:p>
+          <a:p>
+            <a:pPr marL="285750" indent="-285750">
+              <a:buFont typeface="Arial" pitchFamily="34" charset="0"/>
+              <a:buChar char="•"/>
+            </a:pPr>
+            <a:r>
+              <a:rPr lang="ru-RU" sz="2800" dirty="0" smtClean="0">
+                <a:solidFill>
+                  <a:schemeClr val="bg1"/>
+                </a:solidFill>
+              </a:rPr>
+              <a:t>Совместная работа</a:t>
+            </a:r>
+          </a:p>
+          <a:p>
+            <a:pPr marL="742950" lvl="1" indent="-285750">
+              <a:buFont typeface="Arial" pitchFamily="34" charset="0"/>
+              <a:buChar char="•"/>
+            </a:pPr>
+            <a:r>
+              <a:rPr lang="en-US" sz="2800" dirty="0">
+                <a:solidFill>
+                  <a:schemeClr val="bg1"/>
+                </a:solidFill>
+                <a:hlinkClick r:id="rId2"/>
+              </a:rPr>
+              <a:t>https://</a:t>
+            </a:r>
+            <a:r>
+              <a:rPr lang="en-US" sz="2800" dirty="0" smtClean="0">
+                <a:solidFill>
+                  <a:schemeClr val="bg1"/>
+                </a:solidFill>
+                <a:hlinkClick r:id="rId2"/>
+              </a:rPr>
+              <a:t>docs.google.com/spreadsheet/ccc?key=0Ah4Zqg1N7gYQdDR6MWw3NUtDYWVYOWJmTU1HRUtoQnc&amp;usp=sharing</a:t>
             </a:r>
             <a:endParaRPr lang="en-US" sz="2800" dirty="0">
               <a:solidFill>

</xml_diff>

<commit_message>
Updated homework in C# presentations
</commit_message>
<xml_diff>
--- a/Presentation/intro.pptx
+++ b/Presentation/intro.pptx
@@ -5,7 +5,7 @@
     <p:sldMasterId id="2147483648" r:id="rId1"/>
   </p:sldMasterIdLst>
   <p:notesMasterIdLst>
-    <p:notesMasterId r:id="rId11"/>
+    <p:notesMasterId r:id="rId12"/>
   </p:notesMasterIdLst>
   <p:sldIdLst>
     <p:sldId id="257" r:id="rId2"/>
@@ -13,10 +13,11 @@
     <p:sldId id="264" r:id="rId4"/>
     <p:sldId id="261" r:id="rId5"/>
     <p:sldId id="267" r:id="rId6"/>
-    <p:sldId id="262" r:id="rId7"/>
-    <p:sldId id="269" r:id="rId8"/>
-    <p:sldId id="268" r:id="rId9"/>
-    <p:sldId id="263" r:id="rId10"/>
+    <p:sldId id="270" r:id="rId7"/>
+    <p:sldId id="262" r:id="rId8"/>
+    <p:sldId id="269" r:id="rId9"/>
+    <p:sldId id="268" r:id="rId10"/>
+    <p:sldId id="263" r:id="rId11"/>
   </p:sldIdLst>
   <p:sldSz cx="9144000" cy="6858000" type="screen4x3"/>
   <p:notesSz cx="6858000" cy="9144000"/>
@@ -200,7 +201,7 @@
           <a:p>
             <a:fld id="{B24A7054-7FFB-49F4-A126-5DF6E687FF53}" type="datetimeFigureOut">
               <a:rPr lang="ru-RU" smtClean="0"/>
-              <a:t>29.04.2013</a:t>
+              <a:t>04.10.2013</a:t>
             </a:fld>
             <a:endParaRPr lang="ru-RU"/>
           </a:p>
@@ -1482,7 +1483,7 @@
           <a:p>
             <a:fld id="{8E6E6A2A-E9D3-4A0D-B04A-ABDD367A1E08}" type="datetimeFigureOut">
               <a:rPr lang="ru-RU" smtClean="0"/>
-              <a:t>29.04.2013</a:t>
+              <a:t>04.10.2013</a:t>
             </a:fld>
             <a:endParaRPr lang="ru-RU"/>
           </a:p>
@@ -2927,7 +2928,7 @@
           <a:p>
             <a:fld id="{AC3D3127-B7C4-45E3-9797-C527EC9FDD78}" type="datetimeFigureOut">
               <a:rPr lang="ru-RU" smtClean="0"/>
-              <a:t>29.04.2013</a:t>
+              <a:t>04.10.2013</a:t>
             </a:fld>
             <a:endParaRPr lang="ru-RU"/>
           </a:p>
@@ -3481,6 +3482,167 @@
 </p:sld>
 </file>
 
+<file path=ppt/slides/slide10.xml><?xml version="1.0" encoding="utf-8"?>
+<p:sld xmlns:a="http://schemas.openxmlformats.org/drawingml/2006/main" xmlns:r="http://schemas.openxmlformats.org/officeDocument/2006/relationships" xmlns:p="http://schemas.openxmlformats.org/presentationml/2006/main">
+  <p:cSld>
+    <p:spTree>
+      <p:nvGrpSpPr>
+        <p:cNvPr id="1" name=""/>
+        <p:cNvGrpSpPr/>
+        <p:nvPr/>
+      </p:nvGrpSpPr>
+      <p:grpSpPr>
+        <a:xfrm>
+          <a:off x="0" y="0"/>
+          <a:ext cx="0" cy="0"/>
+          <a:chOff x="0" y="0"/>
+          <a:chExt cx="0" cy="0"/>
+        </a:xfrm>
+      </p:grpSpPr>
+      <p:sp>
+        <p:nvSpPr>
+          <p:cNvPr id="4" name="TextBox 3"/>
+          <p:cNvSpPr txBox="1"/>
+          <p:nvPr/>
+        </p:nvSpPr>
+        <p:spPr>
+          <a:xfrm>
+            <a:off x="179512" y="1988840"/>
+            <a:ext cx="8784976" cy="954107"/>
+          </a:xfrm>
+          <a:prstGeom prst="rect">
+            <a:avLst/>
+          </a:prstGeom>
+          <a:noFill/>
+        </p:spPr>
+        <p:txBody>
+          <a:bodyPr wrap="square" rtlCol="0">
+            <a:spAutoFit/>
+          </a:bodyPr>
+          <a:lstStyle/>
+          <a:p>
+            <a:pPr marL="457200" indent="-457200">
+              <a:buFont typeface="Arial" pitchFamily="34" charset="0"/>
+              <a:buChar char="•"/>
+            </a:pPr>
+            <a:r>
+              <a:rPr lang="en-US" sz="2800" dirty="0">
+                <a:solidFill>
+                  <a:schemeClr val="bg1"/>
+                </a:solidFill>
+                <a:hlinkClick r:id="rId2"/>
+              </a:rPr>
+              <a:t>http://</a:t>
+            </a:r>
+            <a:r>
+              <a:rPr lang="en-US" sz="2800" dirty="0" smtClean="0">
+                <a:solidFill>
+                  <a:schemeClr val="bg1"/>
+                </a:solidFill>
+                <a:hlinkClick r:id="rId2"/>
+              </a:rPr>
+              <a:t>www.tc.belhard.com/</a:t>
+            </a:r>
+            <a:endParaRPr lang="ru-RU" sz="2800" dirty="0" smtClean="0">
+              <a:solidFill>
+                <a:schemeClr val="bg1"/>
+              </a:solidFill>
+            </a:endParaRPr>
+          </a:p>
+          <a:p>
+            <a:pPr marL="457200" indent="-457200">
+              <a:buFont typeface="Arial" pitchFamily="34" charset="0"/>
+              <a:buChar char="•"/>
+            </a:pPr>
+            <a:r>
+              <a:rPr lang="en-US" sz="2800" dirty="0" smtClean="0">
+                <a:solidFill>
+                  <a:schemeClr val="bg1"/>
+                </a:solidFill>
+                <a:hlinkClick r:id="rId3"/>
+              </a:rPr>
+              <a:t>http</a:t>
+            </a:r>
+            <a:r>
+              <a:rPr lang="en-US" sz="2800" dirty="0">
+                <a:solidFill>
+                  <a:schemeClr val="bg1"/>
+                </a:solidFill>
+                <a:hlinkClick r:id="rId3"/>
+              </a:rPr>
+              <a:t>://</a:t>
+            </a:r>
+            <a:r>
+              <a:rPr lang="en-US" sz="2800" dirty="0" smtClean="0">
+                <a:solidFill>
+                  <a:schemeClr val="bg1"/>
+                </a:solidFill>
+                <a:hlinkClick r:id="rId3"/>
+              </a:rPr>
+              <a:t>vk.com/club33848893</a:t>
+            </a:r>
+            <a:endParaRPr lang="en-US" sz="2800" dirty="0"/>
+          </a:p>
+        </p:txBody>
+      </p:sp>
+      <p:sp>
+        <p:nvSpPr>
+          <p:cNvPr id="5" name="Rectangle 4"/>
+          <p:cNvSpPr/>
+          <p:nvPr/>
+        </p:nvSpPr>
+        <p:spPr>
+          <a:xfrm>
+            <a:off x="251520" y="188640"/>
+            <a:ext cx="8640960" cy="1446550"/>
+          </a:xfrm>
+          <a:prstGeom prst="rect">
+            <a:avLst/>
+          </a:prstGeom>
+        </p:spPr>
+        <p:txBody>
+          <a:bodyPr wrap="square">
+            <a:spAutoFit/>
+          </a:bodyPr>
+          <a:lstStyle/>
+          <a:p>
+            <a:pPr lvl="0" algn="ctr"/>
+            <a:r>
+              <a:rPr lang="ru-RU" sz="4400" dirty="0" smtClean="0">
+                <a:solidFill>
+                  <a:schemeClr val="bg1"/>
+                </a:solidFill>
+              </a:rPr>
+              <a:t>Центр обучающих технологий «Белхард»</a:t>
+            </a:r>
+            <a:endParaRPr lang="en-US" sz="4400" dirty="0">
+              <a:solidFill>
+                <a:schemeClr val="bg1"/>
+              </a:solidFill>
+            </a:endParaRPr>
+          </a:p>
+        </p:txBody>
+      </p:sp>
+    </p:spTree>
+    <p:extLst>
+      <p:ext uri="{BB962C8B-B14F-4D97-AF65-F5344CB8AC3E}">
+        <p14:creationId xmlns:p14="http://schemas.microsoft.com/office/powerpoint/2010/main" val="1514770362"/>
+      </p:ext>
+    </p:extLst>
+  </p:cSld>
+  <p:clrMapOvr>
+    <a:masterClrMapping/>
+  </p:clrMapOvr>
+  <p:timing>
+    <p:tnLst>
+      <p:par>
+        <p:cTn id="1" dur="indefinite" restart="never" nodeType="tmRoot"/>
+      </p:par>
+    </p:tnLst>
+  </p:timing>
+</p:sld>
+</file>
+
 <file path=ppt/slides/slide2.xml><?xml version="1.0" encoding="utf-8"?>
 <p:sld xmlns:a="http://schemas.openxmlformats.org/drawingml/2006/main" xmlns:r="http://schemas.openxmlformats.org/officeDocument/2006/relationships" xmlns:p="http://schemas.openxmlformats.org/presentationml/2006/main">
   <p:cSld>
@@ -3752,7 +3914,7 @@
         <p:spPr>
           <a:xfrm>
             <a:off x="251520" y="1052736"/>
-            <a:ext cx="8640960" cy="4832092"/>
+            <a:ext cx="8640960" cy="5693866"/>
           </a:xfrm>
           <a:prstGeom prst="rect">
             <a:avLst/>
@@ -3807,8 +3969,35 @@
                   <a:schemeClr val="bg1"/>
                 </a:solidFill>
               </a:rPr>
-              <a:t>19:00, один 5 мин. перерыв</a:t>
-            </a:r>
+              <a:t>19:00, один </a:t>
+            </a:r>
+            <a:r>
+              <a:rPr lang="ru-RU" sz="2800" dirty="0" smtClean="0">
+                <a:solidFill>
+                  <a:schemeClr val="bg1"/>
+                </a:solidFill>
+              </a:rPr>
+              <a:t>перерыв на 5 мин</a:t>
+            </a:r>
+          </a:p>
+          <a:p>
+            <a:pPr marL="742950" lvl="1" indent="-285750">
+              <a:buFont typeface="Arial" pitchFamily="34" charset="0"/>
+              <a:buChar char="•"/>
+            </a:pPr>
+            <a:r>
+              <a:rPr lang="ru-RU" sz="2800" dirty="0" smtClean="0">
+                <a:solidFill>
+                  <a:schemeClr val="bg1"/>
+                </a:solidFill>
+              </a:rPr>
+              <a:t>По возможности предупреждайте об отсутствии на занятии</a:t>
+            </a:r>
+            <a:endParaRPr lang="ru-RU" sz="2800" dirty="0" smtClean="0">
+              <a:solidFill>
+                <a:schemeClr val="bg1"/>
+              </a:solidFill>
+            </a:endParaRPr>
           </a:p>
           <a:p>
             <a:pPr marL="285750" indent="-285750">
@@ -3891,7 +4080,15 @@
                   <a:schemeClr val="bg1"/>
                 </a:solidFill>
               </a:rPr>
-              <a:t>Анкета качества</a:t>
+              <a:t>Анкета </a:t>
+            </a:r>
+            <a:r>
+              <a:rPr lang="ru-RU" sz="2800" dirty="0" smtClean="0">
+                <a:solidFill>
+                  <a:schemeClr val="bg1"/>
+                </a:solidFill>
+              </a:rPr>
+              <a:t>качества</a:t>
             </a:r>
             <a:endParaRPr lang="en-US" sz="2800" dirty="0" smtClean="0">
               <a:solidFill>
@@ -3919,22 +4116,13 @@
               <a:buChar char="•"/>
             </a:pPr>
             <a:r>
-              <a:rPr lang="en-US" sz="2800" dirty="0">
+              <a:rPr lang="en-US" sz="2800" dirty="0" smtClean="0">
                 <a:solidFill>
                   <a:schemeClr val="bg1"/>
                 </a:solidFill>
                 <a:hlinkClick r:id="rId2"/>
               </a:rPr>
-              <a:t>https://</a:t>
-            </a:r>
-            <a:r>
-              <a:rPr lang="en-US" sz="2800" dirty="0" smtClean="0">
-                <a:solidFill>
-                  <a:schemeClr val="bg1"/>
-                </a:solidFill>
-                <a:hlinkClick r:id="rId2"/>
-              </a:rPr>
-              <a:t>docs.google.com/spreadsheet/ccc?key=0Ah4Zqg1N7gYQdDR6MWw3NUtDYWVYOWJmTU1HRUtoQnc&amp;usp=sharing</a:t>
+              <a:t>https://docs.google.com/spreadsheet/ccc?key=0Ah4Zqg1N7gYQdDR6MWw3NUtDYWVYOWJmTU1HRUtoQnc&amp;usp=sharing</a:t>
             </a:r>
             <a:endParaRPr lang="en-US" sz="2800" dirty="0">
               <a:solidFill>
@@ -4152,6 +4340,74 @@
 <file path=ppt/slides/slide6.xml><?xml version="1.0" encoding="utf-8"?>
 <p:sld xmlns:a="http://schemas.openxmlformats.org/drawingml/2006/main" xmlns:r="http://schemas.openxmlformats.org/officeDocument/2006/relationships" xmlns:p="http://schemas.openxmlformats.org/presentationml/2006/main">
   <p:cSld>
+    <p:bg>
+      <p:bgPr>
+        <a:solidFill>
+          <a:srgbClr val="6600CC"/>
+        </a:solidFill>
+        <a:effectLst/>
+      </p:bgPr>
+    </p:bg>
+    <p:spTree>
+      <p:nvGrpSpPr>
+        <p:cNvPr id="1" name=""/>
+        <p:cNvGrpSpPr/>
+        <p:nvPr/>
+      </p:nvGrpSpPr>
+      <p:grpSpPr>
+        <a:xfrm>
+          <a:off x="0" y="0"/>
+          <a:ext cx="0" cy="0"/>
+          <a:chOff x="0" y="0"/>
+          <a:chExt cx="0" cy="0"/>
+        </a:xfrm>
+      </p:grpSpPr>
+      <p:sp>
+        <p:nvSpPr>
+          <p:cNvPr id="2" name="Title 1"/>
+          <p:cNvSpPr>
+            <a:spLocks noGrp="1"/>
+          </p:cNvSpPr>
+          <p:nvPr>
+            <p:ph type="ctrTitle"/>
+          </p:nvPr>
+        </p:nvSpPr>
+        <p:spPr>
+          <a:xfrm>
+            <a:off x="685800" y="2693988"/>
+            <a:ext cx="7772400" cy="1470025"/>
+          </a:xfrm>
+        </p:spPr>
+        <p:txBody>
+          <a:bodyPr>
+            <a:normAutofit fontScale="90000"/>
+          </a:bodyPr>
+          <a:lstStyle/>
+          <a:p>
+            <a:r>
+              <a:rPr lang="ru-RU" dirty="0" smtClean="0"/>
+              <a:t>Таким фоном в презентациях отмечаются задания для самостоятельного выполнения</a:t>
+            </a:r>
+            <a:endParaRPr lang="en-US" dirty="0"/>
+          </a:p>
+        </p:txBody>
+      </p:sp>
+    </p:spTree>
+    <p:extLst>
+      <p:ext uri="{BB962C8B-B14F-4D97-AF65-F5344CB8AC3E}">
+        <p14:creationId xmlns:p14="http://schemas.microsoft.com/office/powerpoint/2010/main" val="3993648252"/>
+      </p:ext>
+    </p:extLst>
+  </p:cSld>
+  <p:clrMapOvr>
+    <a:masterClrMapping/>
+  </p:clrMapOvr>
+</p:sld>
+</file>
+
+<file path=ppt/slides/slide7.xml><?xml version="1.0" encoding="utf-8"?>
+<p:sld xmlns:a="http://schemas.openxmlformats.org/drawingml/2006/main" xmlns:r="http://schemas.openxmlformats.org/officeDocument/2006/relationships" xmlns:p="http://schemas.openxmlformats.org/presentationml/2006/main">
+  <p:cSld>
     <p:spTree>
       <p:nvGrpSpPr>
         <p:cNvPr id="1" name=""/>
@@ -4224,344 +4480,6 @@
 </p:sld>
 </file>
 
-<file path=ppt/slides/slide7.xml><?xml version="1.0" encoding="utf-8"?>
-<p:sld xmlns:a="http://schemas.openxmlformats.org/drawingml/2006/main" xmlns:r="http://schemas.openxmlformats.org/officeDocument/2006/relationships" xmlns:p="http://schemas.openxmlformats.org/presentationml/2006/main">
-  <p:cSld>
-    <p:spTree>
-      <p:nvGrpSpPr>
-        <p:cNvPr id="1" name=""/>
-        <p:cNvGrpSpPr/>
-        <p:nvPr/>
-      </p:nvGrpSpPr>
-      <p:grpSpPr>
-        <a:xfrm>
-          <a:off x="0" y="0"/>
-          <a:ext cx="0" cy="0"/>
-          <a:chOff x="0" y="0"/>
-          <a:chExt cx="0" cy="0"/>
-        </a:xfrm>
-      </p:grpSpPr>
-      <p:sp>
-        <p:nvSpPr>
-          <p:cNvPr id="2" name="Title 1"/>
-          <p:cNvSpPr>
-            <a:spLocks noGrp="1"/>
-          </p:cNvSpPr>
-          <p:nvPr>
-            <p:ph type="title"/>
-          </p:nvPr>
-        </p:nvSpPr>
-        <p:spPr/>
-        <p:txBody>
-          <a:bodyPr/>
-          <a:lstStyle/>
-          <a:p>
-            <a:r>
-              <a:rPr lang="ru-RU" dirty="0" smtClean="0"/>
-              <a:t>Программа занятий</a:t>
-            </a:r>
-            <a:endParaRPr lang="ru-RU" dirty="0"/>
-          </a:p>
-        </p:txBody>
-      </p:sp>
-      <p:sp>
-        <p:nvSpPr>
-          <p:cNvPr id="3" name="Content Placeholder 2"/>
-          <p:cNvSpPr>
-            <a:spLocks noGrp="1"/>
-          </p:cNvSpPr>
-          <p:nvPr>
-            <p:ph idx="1"/>
-          </p:nvPr>
-        </p:nvSpPr>
-        <p:spPr/>
-        <p:txBody>
-          <a:bodyPr>
-            <a:normAutofit fontScale="55000" lnSpcReduction="20000"/>
-          </a:bodyPr>
-          <a:lstStyle/>
-          <a:p>
-            <a:pPr marL="514350" indent="-514350">
-              <a:buFont typeface="+mj-lt"/>
-              <a:buAutoNum type="arabicPeriod"/>
-            </a:pPr>
-            <a:r>
-              <a:rPr lang="ru-RU" dirty="0" smtClean="0"/>
-              <a:t>Введение </a:t>
-            </a:r>
-            <a:r>
-              <a:rPr lang="ru-RU" dirty="0"/>
-              <a:t>в С# и .NET </a:t>
-            </a:r>
-            <a:r>
-              <a:rPr lang="ru-RU" dirty="0" smtClean="0"/>
-              <a:t>Framework.</a:t>
-            </a:r>
-          </a:p>
-          <a:p>
-            <a:pPr marL="514350" indent="-514350">
-              <a:buFont typeface="+mj-lt"/>
-              <a:buAutoNum type="arabicPeriod"/>
-            </a:pPr>
-            <a:r>
-              <a:rPr lang="ru-RU" dirty="0" smtClean="0"/>
-              <a:t>Основы объектно-ориентированного программирования </a:t>
-            </a:r>
-            <a:r>
-              <a:rPr lang="en-US" dirty="0" smtClean="0"/>
-              <a:t>(</a:t>
-            </a:r>
-            <a:r>
-              <a:rPr lang="ru-RU" dirty="0" smtClean="0"/>
-              <a:t>ООП).</a:t>
-            </a:r>
-          </a:p>
-          <a:p>
-            <a:pPr marL="514350" indent="-514350">
-              <a:buFont typeface="+mj-lt"/>
-              <a:buAutoNum type="arabicPeriod"/>
-            </a:pPr>
-            <a:r>
-              <a:rPr lang="ru-RU" dirty="0" smtClean="0"/>
-              <a:t>Углубленные </a:t>
-            </a:r>
-            <a:r>
-              <a:rPr lang="ru-RU" dirty="0"/>
-              <a:t>основы ООП. Жизненный цикл </a:t>
-            </a:r>
-            <a:r>
-              <a:rPr lang="ru-RU" dirty="0" smtClean="0"/>
-              <a:t>объекта.</a:t>
-            </a:r>
-          </a:p>
-          <a:p>
-            <a:pPr marL="514350" indent="-514350">
-              <a:buFont typeface="+mj-lt"/>
-              <a:buAutoNum type="arabicPeriod"/>
-            </a:pPr>
-            <a:r>
-              <a:rPr lang="ru-RU" dirty="0"/>
-              <a:t>Средства </a:t>
-            </a:r>
-            <a:r>
-              <a:rPr lang="ru-RU" dirty="0" smtClean="0"/>
-              <a:t>ввода/вывода.</a:t>
-            </a:r>
-          </a:p>
-          <a:p>
-            <a:pPr marL="514350" indent="-514350">
-              <a:buFont typeface="+mj-lt"/>
-              <a:buAutoNum type="arabicPeriod"/>
-            </a:pPr>
-            <a:r>
-              <a:rPr lang="ru-RU" dirty="0" smtClean="0"/>
-              <a:t>Делегаты </a:t>
-            </a:r>
-            <a:r>
-              <a:rPr lang="ru-RU" dirty="0"/>
-              <a:t>и </a:t>
-            </a:r>
-            <a:r>
-              <a:rPr lang="ru-RU" dirty="0" smtClean="0"/>
-              <a:t>события</a:t>
-            </a:r>
-            <a:r>
-              <a:rPr lang="en-US" dirty="0" smtClean="0"/>
-              <a:t>. </a:t>
-            </a:r>
-            <a:r>
-              <a:rPr lang="ru-RU" dirty="0" smtClean="0"/>
-              <a:t>Введение </a:t>
-            </a:r>
-            <a:r>
-              <a:rPr lang="ru-RU" dirty="0"/>
-              <a:t>в технологию </a:t>
-            </a:r>
-            <a:r>
-              <a:rPr lang="en-US" dirty="0" smtClean="0"/>
-              <a:t>Windows Forms</a:t>
-            </a:r>
-            <a:r>
-              <a:rPr lang="ru-RU" dirty="0" smtClean="0"/>
-              <a:t>.</a:t>
-            </a:r>
-          </a:p>
-          <a:p>
-            <a:pPr marL="514350" indent="-514350">
-              <a:buFont typeface="+mj-lt"/>
-              <a:buAutoNum type="arabicPeriod"/>
-            </a:pPr>
-            <a:r>
-              <a:rPr lang="ru-RU" dirty="0"/>
-              <a:t>Работа с </a:t>
-            </a:r>
-            <a:r>
-              <a:rPr lang="ru-RU" dirty="0" smtClean="0"/>
-              <a:t>XML.</a:t>
-            </a:r>
-          </a:p>
-          <a:p>
-            <a:pPr marL="514350" indent="-514350">
-              <a:buFont typeface="+mj-lt"/>
-              <a:buAutoNum type="arabicPeriod"/>
-            </a:pPr>
-            <a:r>
-              <a:rPr lang="ru-RU" dirty="0" smtClean="0"/>
-              <a:t>Понятие </a:t>
-            </a:r>
-            <a:r>
-              <a:rPr lang="ru-RU" dirty="0"/>
-              <a:t>сборки. </a:t>
-            </a:r>
-            <a:r>
-              <a:rPr lang="ru-RU" dirty="0" smtClean="0"/>
-              <a:t>Отражение.</a:t>
-            </a:r>
-          </a:p>
-          <a:p>
-            <a:pPr marL="514350" indent="-514350">
-              <a:buFont typeface="+mj-lt"/>
-              <a:buAutoNum type="arabicPeriod"/>
-            </a:pPr>
-            <a:r>
-              <a:rPr lang="ru-RU" dirty="0"/>
-              <a:t>Многопоточное </a:t>
-            </a:r>
-            <a:r>
-              <a:rPr lang="ru-RU" dirty="0" smtClean="0"/>
-              <a:t>программирование.</a:t>
-            </a:r>
-            <a:endParaRPr lang="en-US" dirty="0" smtClean="0"/>
-          </a:p>
-          <a:p>
-            <a:pPr marL="514350" indent="-514350">
-              <a:buFont typeface="+mj-lt"/>
-              <a:buAutoNum type="arabicPeriod"/>
-            </a:pPr>
-            <a:r>
-              <a:rPr lang="ru-RU" dirty="0" smtClean="0"/>
-              <a:t>Язык запросов </a:t>
-            </a:r>
-            <a:r>
-              <a:rPr lang="en-US" dirty="0" smtClean="0"/>
-              <a:t>LINQ (Language Integrated Query)</a:t>
-            </a:r>
-            <a:r>
-              <a:rPr lang="ru-RU" dirty="0" smtClean="0"/>
-              <a:t>.</a:t>
-            </a:r>
-          </a:p>
-          <a:p>
-            <a:pPr marL="514350" indent="-514350">
-              <a:buFont typeface="+mj-lt"/>
-              <a:buAutoNum type="arabicPeriod"/>
-            </a:pPr>
-            <a:r>
-              <a:rPr lang="ru-RU" dirty="0" smtClean="0"/>
-              <a:t>Введение в </a:t>
-            </a:r>
-            <a:r>
-              <a:rPr lang="en-US" dirty="0" smtClean="0"/>
-              <a:t>SQL</a:t>
-            </a:r>
-            <a:r>
-              <a:rPr lang="ru-RU" dirty="0" smtClean="0"/>
-              <a:t>.</a:t>
-            </a:r>
-            <a:endParaRPr lang="en-US" dirty="0" smtClean="0"/>
-          </a:p>
-          <a:p>
-            <a:pPr marL="514350" indent="-514350">
-              <a:buFont typeface="+mj-lt"/>
-              <a:buAutoNum type="arabicPeriod"/>
-            </a:pPr>
-            <a:r>
-              <a:rPr lang="ru-RU" dirty="0"/>
-              <a:t>Доступ к данным с использованием </a:t>
-            </a:r>
-            <a:r>
-              <a:rPr lang="ru-RU" dirty="0" smtClean="0"/>
-              <a:t>ADO.NET.</a:t>
-            </a:r>
-            <a:endParaRPr lang="en-US" dirty="0" smtClean="0"/>
-          </a:p>
-          <a:p>
-            <a:pPr marL="514350" indent="-514350">
-              <a:buFont typeface="+mj-lt"/>
-              <a:buAutoNum type="arabicPeriod"/>
-            </a:pPr>
-            <a:r>
-              <a:rPr lang="ru-RU" dirty="0" smtClean="0"/>
-              <a:t>Создание </a:t>
-            </a:r>
-            <a:r>
-              <a:rPr lang="en-US" dirty="0" smtClean="0"/>
-              <a:t>GUI </a:t>
-            </a:r>
-            <a:r>
-              <a:rPr lang="ru-RU" dirty="0" smtClean="0"/>
-              <a:t>приложений с помощью </a:t>
-            </a:r>
-            <a:r>
-              <a:rPr lang="en-US" dirty="0" smtClean="0"/>
-              <a:t>WPF</a:t>
-            </a:r>
-            <a:r>
-              <a:rPr lang="ru-RU" dirty="0"/>
-              <a:t>.</a:t>
-            </a:r>
-            <a:endParaRPr lang="ru-RU" dirty="0" smtClean="0"/>
-          </a:p>
-          <a:p>
-            <a:pPr marL="514350" indent="-514350">
-              <a:buFont typeface="+mj-lt"/>
-              <a:buAutoNum type="arabicPeriod"/>
-            </a:pPr>
-            <a:r>
-              <a:rPr lang="ru-RU" smtClean="0"/>
-              <a:t>Создание распределенных </a:t>
-            </a:r>
-            <a:r>
-              <a:rPr lang="ru-RU" dirty="0" smtClean="0"/>
-              <a:t>приложений на основе WCF.</a:t>
-            </a:r>
-          </a:p>
-          <a:p>
-            <a:pPr marL="514350" indent="-514350">
-              <a:buFont typeface="+mj-lt"/>
-              <a:buAutoNum type="arabicPeriod"/>
-            </a:pPr>
-            <a:r>
-              <a:rPr lang="ru-RU" dirty="0" smtClean="0"/>
-              <a:t>Архитектура приложений.</a:t>
-            </a:r>
-          </a:p>
-          <a:p>
-            <a:pPr marL="514350" indent="-514350">
-              <a:buFont typeface="+mj-lt"/>
-              <a:buAutoNum type="arabicPeriod"/>
-            </a:pPr>
-            <a:r>
-              <a:rPr lang="ru-RU" dirty="0" smtClean="0"/>
-              <a:t>Шаблоны проектирования.</a:t>
-            </a:r>
-            <a:endParaRPr lang="ru-RU" dirty="0"/>
-          </a:p>
-        </p:txBody>
-      </p:sp>
-    </p:spTree>
-    <p:extLst>
-      <p:ext uri="{BB962C8B-B14F-4D97-AF65-F5344CB8AC3E}">
-        <p14:creationId xmlns:p14="http://schemas.microsoft.com/office/powerpoint/2010/main" val="1676107435"/>
-      </p:ext>
-    </p:extLst>
-  </p:cSld>
-  <p:clrMapOvr>
-    <a:masterClrMapping/>
-  </p:clrMapOvr>
-</p:sld>
-</file>
-
 <file path=ppt/slides/slide8.xml><?xml version="1.0" encoding="utf-8"?>
 <p:sld xmlns:a="http://schemas.openxmlformats.org/drawingml/2006/main" xmlns:r="http://schemas.openxmlformats.org/officeDocument/2006/relationships" xmlns:p="http://schemas.openxmlformats.org/presentationml/2006/main">
   <p:cSld>
@@ -4591,14 +4509,12 @@
         </p:nvSpPr>
         <p:spPr/>
         <p:txBody>
-          <a:bodyPr>
-            <a:normAutofit fontScale="90000"/>
-          </a:bodyPr>
+          <a:bodyPr/>
           <a:lstStyle/>
           <a:p>
             <a:r>
               <a:rPr lang="ru-RU" dirty="0" smtClean="0"/>
-              <a:t>Рекомендуемое программное обеспечение</a:t>
+              <a:t>Программа занятий</a:t>
             </a:r>
             <a:endParaRPr lang="ru-RU" dirty="0"/>
           </a:p>
@@ -4617,317 +4533,274 @@
         <p:spPr/>
         <p:txBody>
           <a:bodyPr>
-            <a:normAutofit fontScale="70000" lnSpcReduction="20000"/>
+            <a:normAutofit fontScale="55000" lnSpcReduction="20000"/>
           </a:bodyPr>
           <a:lstStyle/>
           <a:p>
-            <a:r>
-              <a:rPr lang="en-US" dirty="0" smtClean="0">
-                <a:solidFill>
-                  <a:srgbClr val="92D050"/>
-                </a:solidFill>
-              </a:rPr>
-              <a:t>Microsoft Visual Studio 2010 </a:t>
-            </a:r>
-            <a:r>
-              <a:rPr lang="ru-RU" dirty="0" smtClean="0">
-                <a:solidFill>
-                  <a:srgbClr val="92D050"/>
-                </a:solidFill>
-              </a:rPr>
-              <a:t>или 2012</a:t>
-            </a:r>
-          </a:p>
-          <a:p>
-            <a:pPr lvl="1"/>
-            <a:r>
-              <a:rPr lang="ru-RU" dirty="0" smtClean="0">
-                <a:solidFill>
-                  <a:srgbClr val="92D050"/>
-                </a:solidFill>
-              </a:rPr>
-              <a:t>Обязательно установите </a:t>
-            </a:r>
-            <a:r>
-              <a:rPr lang="en-US" dirty="0" smtClean="0">
-                <a:solidFill>
-                  <a:srgbClr val="92D050"/>
-                </a:solidFill>
-              </a:rPr>
-              <a:t>Service Pack 1 </a:t>
-            </a:r>
-            <a:r>
-              <a:rPr lang="ru-RU" dirty="0" smtClean="0">
-                <a:solidFill>
-                  <a:srgbClr val="92D050"/>
-                </a:solidFill>
-              </a:rPr>
-              <a:t>для </a:t>
-            </a:r>
-            <a:r>
-              <a:rPr lang="en-US" dirty="0" smtClean="0">
-                <a:solidFill>
-                  <a:srgbClr val="92D050"/>
-                </a:solidFill>
-              </a:rPr>
-              <a:t>Visual Studio 2010 </a:t>
-            </a:r>
-            <a:r>
-              <a:rPr lang="ru-RU" dirty="0" smtClean="0">
-                <a:solidFill>
-                  <a:srgbClr val="92D050"/>
-                </a:solidFill>
-              </a:rPr>
-              <a:t>и/или </a:t>
-            </a:r>
-            <a:r>
-              <a:rPr lang="en-US" dirty="0" smtClean="0">
-                <a:solidFill>
-                  <a:srgbClr val="92D050"/>
-                </a:solidFill>
-              </a:rPr>
-              <a:t>Update 2 </a:t>
-            </a:r>
-            <a:r>
-              <a:rPr lang="ru-RU" dirty="0" smtClean="0">
-                <a:solidFill>
-                  <a:srgbClr val="92D050"/>
-                </a:solidFill>
-              </a:rPr>
-              <a:t>для </a:t>
-            </a:r>
-            <a:r>
-              <a:rPr lang="en-US" dirty="0" smtClean="0">
-                <a:solidFill>
-                  <a:srgbClr val="92D050"/>
-                </a:solidFill>
-              </a:rPr>
-              <a:t>Visual Studio 2012</a:t>
-            </a:r>
-            <a:endParaRPr lang="ru-RU" dirty="0" smtClean="0">
-              <a:solidFill>
-                <a:srgbClr val="92D050"/>
-              </a:solidFill>
-            </a:endParaRPr>
-          </a:p>
-          <a:p>
-            <a:pPr lvl="1"/>
+            <a:pPr marL="514350" indent="-514350">
+              <a:buFont typeface="+mj-lt"/>
+              <a:buAutoNum type="arabicPeriod"/>
+            </a:pPr>
+            <a:r>
+              <a:rPr lang="ru-RU" dirty="0" smtClean="0"/>
+              <a:t>Введение </a:t>
+            </a:r>
+            <a:r>
+              <a:rPr lang="ru-RU" dirty="0"/>
+              <a:t>в С# и .NET </a:t>
+            </a:r>
+            <a:r>
+              <a:rPr lang="ru-RU" dirty="0" smtClean="0"/>
+              <a:t>Framework.</a:t>
+            </a:r>
+          </a:p>
+          <a:p>
+            <a:pPr marL="514350" indent="-514350">
+              <a:buFont typeface="+mj-lt"/>
+              <a:buAutoNum type="arabicPeriod"/>
+            </a:pPr>
+            <a:r>
+              <a:rPr lang="ru-RU" dirty="0" smtClean="0"/>
+              <a:t>Основы объектно-ориентированного программирования </a:t>
+            </a:r>
             <a:r>
               <a:rPr lang="en-US" dirty="0" smtClean="0"/>
-              <a:t>NuGet</a:t>
-            </a:r>
-            <a:r>
-              <a:rPr lang="en-US" dirty="0"/>
-              <a:t>: </a:t>
-            </a:r>
-            <a:r>
-              <a:rPr lang="en-US" dirty="0">
-                <a:hlinkClick r:id="rId2"/>
-              </a:rPr>
-              <a:t>http://nuget.org</a:t>
-            </a:r>
-            <a:r>
-              <a:rPr lang="en-US" dirty="0" smtClean="0">
-                <a:hlinkClick r:id="rId2"/>
-              </a:rPr>
-              <a:t>/</a:t>
+              <a:t>(</a:t>
+            </a:r>
+            <a:r>
+              <a:rPr lang="ru-RU" dirty="0" smtClean="0"/>
+              <a:t>ООП).</a:t>
+            </a:r>
+          </a:p>
+          <a:p>
+            <a:pPr marL="514350" indent="-514350">
+              <a:buFont typeface="+mj-lt"/>
+              <a:buAutoNum type="arabicPeriod"/>
+            </a:pPr>
+            <a:r>
+              <a:rPr lang="ru-RU" dirty="0" smtClean="0"/>
+              <a:t>Углубленные </a:t>
+            </a:r>
+            <a:r>
+              <a:rPr lang="ru-RU" dirty="0"/>
+              <a:t>основы ООП. Жизненный цикл </a:t>
+            </a:r>
+            <a:r>
+              <a:rPr lang="ru-RU" dirty="0" smtClean="0"/>
+              <a:t>объекта.</a:t>
+            </a:r>
+          </a:p>
+          <a:p>
+            <a:pPr marL="514350" indent="-514350">
+              <a:buFont typeface="+mj-lt"/>
+              <a:buAutoNum type="arabicPeriod"/>
+            </a:pPr>
+            <a:r>
+              <a:rPr lang="ru-RU" dirty="0"/>
+              <a:t>Средства </a:t>
+            </a:r>
+            <a:r>
+              <a:rPr lang="ru-RU" dirty="0" smtClean="0"/>
+              <a:t>ввода/вывода.</a:t>
+            </a:r>
+          </a:p>
+          <a:p>
+            <a:pPr marL="514350" indent="-514350">
+              <a:buFont typeface="+mj-lt"/>
+              <a:buAutoNum type="arabicPeriod"/>
+            </a:pPr>
+            <a:r>
+              <a:rPr lang="ru-RU" dirty="0" smtClean="0"/>
+              <a:t>Делегаты </a:t>
+            </a:r>
+            <a:r>
+              <a:rPr lang="ru-RU" dirty="0"/>
+              <a:t>и </a:t>
+            </a:r>
+            <a:r>
+              <a:rPr lang="ru-RU" dirty="0" smtClean="0"/>
+              <a:t>события</a:t>
+            </a:r>
+            <a:r>
+              <a:rPr lang="en-US" dirty="0" smtClean="0"/>
+              <a:t>. </a:t>
+            </a:r>
+            <a:r>
+              <a:rPr lang="ru-RU" dirty="0" smtClean="0"/>
+              <a:t>Введение </a:t>
+            </a:r>
+            <a:r>
+              <a:rPr lang="ru-RU" dirty="0"/>
+              <a:t>в технологию </a:t>
+            </a:r>
+            <a:r>
+              <a:rPr lang="en-US" dirty="0" smtClean="0"/>
+              <a:t>Windows Forms</a:t>
+            </a:r>
+            <a:r>
+              <a:rPr lang="ru-RU" dirty="0" smtClean="0"/>
+              <a:t>.</a:t>
+            </a:r>
+          </a:p>
+          <a:p>
+            <a:pPr marL="514350" indent="-514350">
+              <a:buFont typeface="+mj-lt"/>
+              <a:buAutoNum type="arabicPeriod"/>
+            </a:pPr>
+            <a:r>
+              <a:rPr lang="ru-RU" dirty="0"/>
+              <a:t>Работа с </a:t>
+            </a:r>
+            <a:r>
+              <a:rPr lang="ru-RU" dirty="0" smtClean="0"/>
+              <a:t>XML.</a:t>
+            </a:r>
+          </a:p>
+          <a:p>
+            <a:pPr marL="514350" indent="-514350">
+              <a:buFont typeface="+mj-lt"/>
+              <a:buAutoNum type="arabicPeriod"/>
+            </a:pPr>
+            <a:r>
+              <a:rPr lang="ru-RU" dirty="0" smtClean="0"/>
+              <a:t>Понятие </a:t>
+            </a:r>
+            <a:r>
+              <a:rPr lang="ru-RU" dirty="0"/>
+              <a:t>сборки. </a:t>
+            </a:r>
+            <a:r>
+              <a:rPr lang="ru-RU" dirty="0" smtClean="0"/>
+              <a:t>Отражение.</a:t>
+            </a:r>
+          </a:p>
+          <a:p>
+            <a:pPr marL="514350" indent="-514350">
+              <a:buFont typeface="+mj-lt"/>
+              <a:buAutoNum type="arabicPeriod"/>
+            </a:pPr>
+            <a:r>
+              <a:rPr lang="ru-RU" dirty="0"/>
+              <a:t>Многопоточное </a:t>
+            </a:r>
+            <a:r>
+              <a:rPr lang="ru-RU" dirty="0" smtClean="0"/>
+              <a:t>программирование.</a:t>
             </a:r>
             <a:endParaRPr lang="en-US" dirty="0" smtClean="0"/>
           </a:p>
           <a:p>
-            <a:pPr lvl="1"/>
+            <a:pPr marL="514350" indent="-514350">
+              <a:buFont typeface="+mj-lt"/>
+              <a:buAutoNum type="arabicPeriod"/>
+            </a:pPr>
+            <a:r>
+              <a:rPr lang="ru-RU" dirty="0" smtClean="0"/>
+              <a:t>Язык запросов </a:t>
+            </a:r>
             <a:r>
               <a:rPr lang="en-US" dirty="0" smtClean="0"/>
-              <a:t>Productivity Power </a:t>
-            </a:r>
-            <a:r>
-              <a:rPr lang="en-US" dirty="0"/>
-              <a:t>Tools: </a:t>
-            </a:r>
-            <a:r>
-              <a:rPr lang="en-US" dirty="0">
-                <a:hlinkClick r:id="rId3"/>
-              </a:rPr>
-              <a:t>http://</a:t>
-            </a:r>
-            <a:r>
-              <a:rPr lang="en-US" dirty="0" smtClean="0">
-                <a:hlinkClick r:id="rId3"/>
-              </a:rPr>
-              <a:t>visualstudiogallery.msdn.microsoft.com</a:t>
+              <a:t>LINQ (Language Integrated Query)</a:t>
+            </a:r>
+            <a:r>
+              <a:rPr lang="ru-RU" dirty="0" smtClean="0"/>
+              <a:t>.</a:t>
+            </a:r>
+          </a:p>
+          <a:p>
+            <a:pPr marL="514350" indent="-514350">
+              <a:buFont typeface="+mj-lt"/>
+              <a:buAutoNum type="arabicPeriod"/>
+            </a:pPr>
+            <a:r>
+              <a:rPr lang="ru-RU" dirty="0" smtClean="0"/>
+              <a:t>Введение в </a:t>
+            </a:r>
+            <a:r>
+              <a:rPr lang="en-US" dirty="0" smtClean="0"/>
+              <a:t>SQL</a:t>
+            </a:r>
+            <a:r>
+              <a:rPr lang="ru-RU" dirty="0" smtClean="0"/>
+              <a:t>.</a:t>
             </a:r>
             <a:endParaRPr lang="en-US" dirty="0" smtClean="0"/>
           </a:p>
           <a:p>
-            <a:pPr lvl="1"/>
-            <a:r>
-              <a:rPr lang="en-US" dirty="0"/>
-              <a:t>ReSharper: </a:t>
-            </a:r>
-            <a:r>
-              <a:rPr lang="en-US" dirty="0">
-                <a:hlinkClick r:id="rId4"/>
-              </a:rPr>
-              <a:t>http://www.jetbrains.com/resharper/</a:t>
+            <a:pPr marL="514350" indent="-514350">
+              <a:buFont typeface="+mj-lt"/>
+              <a:buAutoNum type="arabicPeriod"/>
+            </a:pPr>
+            <a:r>
+              <a:rPr lang="ru-RU" dirty="0"/>
+              <a:t>Доступ к данным с использованием </a:t>
+            </a:r>
+            <a:r>
+              <a:rPr lang="ru-RU" dirty="0" smtClean="0"/>
+              <a:t>ADO.NET.</a:t>
             </a:r>
             <a:endParaRPr lang="en-US" dirty="0" smtClean="0"/>
           </a:p>
           <a:p>
-            <a:r>
-              <a:rPr lang="en-US" dirty="0" smtClean="0">
-                <a:solidFill>
-                  <a:srgbClr val="92D050"/>
-                </a:solidFill>
-              </a:rPr>
-              <a:t>Microsoft SQL Server Express 2005 </a:t>
-            </a:r>
-            <a:r>
-              <a:rPr lang="ru-RU" dirty="0" smtClean="0">
-                <a:solidFill>
-                  <a:srgbClr val="92D050"/>
-                </a:solidFill>
-              </a:rPr>
-              <a:t>или выше</a:t>
-            </a:r>
-            <a:endParaRPr lang="en-US" dirty="0" smtClean="0">
-              <a:solidFill>
-                <a:srgbClr val="92D050"/>
-              </a:solidFill>
-            </a:endParaRPr>
-          </a:p>
-          <a:p>
-            <a:pPr lvl="1"/>
-            <a:r>
-              <a:rPr lang="ru-RU" dirty="0" smtClean="0">
-                <a:solidFill>
-                  <a:schemeClr val="bg1"/>
-                </a:solidFill>
-              </a:rPr>
-              <a:t>Возможно понадобится доустановить </a:t>
-            </a:r>
-            <a:r>
-              <a:rPr lang="en-US" dirty="0">
-                <a:solidFill>
-                  <a:schemeClr val="bg1"/>
-                </a:solidFill>
-              </a:rPr>
-              <a:t>Microsoft SQL Server Management Studio </a:t>
-            </a:r>
-            <a:r>
-              <a:rPr lang="en-US" dirty="0" smtClean="0">
-                <a:solidFill>
-                  <a:schemeClr val="bg1"/>
-                </a:solidFill>
-              </a:rPr>
-              <a:t>Express</a:t>
-            </a:r>
-            <a:endParaRPr lang="ru-RU" dirty="0" smtClean="0">
-              <a:solidFill>
-                <a:schemeClr val="bg1"/>
-              </a:solidFill>
-            </a:endParaRPr>
-          </a:p>
-          <a:p>
-            <a:pPr lvl="1"/>
-            <a:r>
-              <a:rPr lang="en-US" dirty="0">
-                <a:solidFill>
-                  <a:schemeClr val="bg1"/>
-                </a:solidFill>
-                <a:hlinkClick r:id="rId5"/>
-              </a:rPr>
-              <a:t>http://www.microsoft.com/downloads</a:t>
-            </a:r>
-            <a:r>
-              <a:rPr lang="en-US" dirty="0" smtClean="0">
-                <a:solidFill>
-                  <a:schemeClr val="bg1"/>
-                </a:solidFill>
-                <a:hlinkClick r:id="rId5"/>
-              </a:rPr>
-              <a:t>/</a:t>
-            </a:r>
-            <a:endParaRPr lang="en-US" dirty="0">
-              <a:solidFill>
-                <a:schemeClr val="bg1"/>
-              </a:solidFill>
-            </a:endParaRPr>
-          </a:p>
-          <a:p>
-            <a:r>
-              <a:rPr lang="en-US" dirty="0" err="1" smtClean="0"/>
-              <a:t>LINQPad</a:t>
-            </a:r>
-            <a:r>
-              <a:rPr lang="en-US" dirty="0"/>
-              <a:t>: </a:t>
-            </a:r>
-            <a:r>
-              <a:rPr lang="en-US" dirty="0">
-                <a:hlinkClick r:id="rId6"/>
-              </a:rPr>
-              <a:t>http://www.linqpad.net</a:t>
-            </a:r>
-            <a:r>
-              <a:rPr lang="en-US" dirty="0" smtClean="0">
-                <a:hlinkClick r:id="rId6"/>
-              </a:rPr>
-              <a:t>/</a:t>
-            </a:r>
-            <a:endParaRPr lang="en-US" dirty="0" smtClean="0"/>
-          </a:p>
-          <a:p>
-            <a:r>
-              <a:rPr lang="en-US" dirty="0" err="1" smtClean="0"/>
-              <a:t>dotPeek</a:t>
+            <a:pPr marL="514350" indent="-514350">
+              <a:buFont typeface="+mj-lt"/>
+              <a:buAutoNum type="arabicPeriod"/>
+            </a:pPr>
+            <a:r>
+              <a:rPr lang="ru-RU" dirty="0" smtClean="0"/>
+              <a:t>Создание </a:t>
             </a:r>
             <a:r>
               <a:rPr lang="en-US" dirty="0" smtClean="0"/>
-              <a:t>: </a:t>
-            </a:r>
-            <a:r>
-              <a:rPr lang="en-US" dirty="0" smtClean="0">
-                <a:hlinkClick r:id="rId7"/>
-              </a:rPr>
-              <a:t>http</a:t>
-            </a:r>
-            <a:r>
-              <a:rPr lang="en-US" dirty="0">
-                <a:hlinkClick r:id="rId7"/>
-              </a:rPr>
-              <a:t>://www.jetbrains.com/decompiler</a:t>
-            </a:r>
-            <a:r>
-              <a:rPr lang="en-US" dirty="0" smtClean="0">
-                <a:hlinkClick r:id="rId7"/>
-              </a:rPr>
-              <a:t>/</a:t>
-            </a:r>
-            <a:endParaRPr lang="en-US" dirty="0" smtClean="0"/>
-          </a:p>
-          <a:p>
+              <a:t>GUI </a:t>
+            </a:r>
+            <a:r>
+              <a:rPr lang="ru-RU" dirty="0" smtClean="0"/>
+              <a:t>приложений с помощью </a:t>
+            </a:r>
             <a:r>
               <a:rPr lang="en-US" dirty="0" smtClean="0"/>
-              <a:t>KDiff3: </a:t>
-            </a:r>
-            <a:r>
-              <a:rPr lang="en-US" dirty="0">
-                <a:hlinkClick r:id="rId8"/>
-              </a:rPr>
-              <a:t>http://kdiff3.sourceforge.net</a:t>
-            </a:r>
-            <a:r>
-              <a:rPr lang="en-US" dirty="0" smtClean="0">
-                <a:hlinkClick r:id="rId8"/>
-              </a:rPr>
-              <a:t>/</a:t>
-            </a:r>
-            <a:endParaRPr lang="en-US" dirty="0" smtClean="0"/>
-          </a:p>
-          <a:p>
+              <a:t>WPF</a:t>
+            </a:r>
+            <a:r>
+              <a:rPr lang="ru-RU" dirty="0"/>
+              <a:t>.</a:t>
+            </a:r>
             <a:endParaRPr lang="ru-RU" dirty="0" smtClean="0"/>
           </a:p>
           <a:p>
+            <a:pPr marL="514350" indent="-514350">
+              <a:buFont typeface="+mj-lt"/>
+              <a:buAutoNum type="arabicPeriod"/>
+            </a:pPr>
+            <a:r>
+              <a:rPr lang="ru-RU" smtClean="0"/>
+              <a:t>Создание распределенных </a:t>
+            </a:r>
+            <a:r>
+              <a:rPr lang="ru-RU" dirty="0" smtClean="0"/>
+              <a:t>приложений на основе WCF.</a:t>
+            </a:r>
+          </a:p>
+          <a:p>
+            <a:pPr marL="514350" indent="-514350">
+              <a:buFont typeface="+mj-lt"/>
+              <a:buAutoNum type="arabicPeriod"/>
+            </a:pPr>
+            <a:r>
+              <a:rPr lang="ru-RU" dirty="0" smtClean="0"/>
+              <a:t>Архитектура приложений.</a:t>
+            </a:r>
+          </a:p>
+          <a:p>
+            <a:pPr marL="514350" indent="-514350">
+              <a:buFont typeface="+mj-lt"/>
+              <a:buAutoNum type="arabicPeriod"/>
+            </a:pPr>
+            <a:r>
+              <a:rPr lang="ru-RU" dirty="0" smtClean="0"/>
+              <a:t>Шаблоны проектирования.</a:t>
+            </a:r>
             <a:endParaRPr lang="ru-RU" dirty="0"/>
           </a:p>
         </p:txBody>
@@ -4935,20 +4808,13 @@
     </p:spTree>
     <p:extLst>
       <p:ext uri="{BB962C8B-B14F-4D97-AF65-F5344CB8AC3E}">
-        <p14:creationId xmlns:p14="http://schemas.microsoft.com/office/powerpoint/2010/main" val="2844174280"/>
+        <p14:creationId xmlns:p14="http://schemas.microsoft.com/office/powerpoint/2010/main" val="1676107435"/>
       </p:ext>
     </p:extLst>
   </p:cSld>
   <p:clrMapOvr>
     <a:masterClrMapping/>
   </p:clrMapOvr>
-  <p:timing>
-    <p:tnLst>
-      <p:par>
-        <p:cTn id="1" dur="indefinite" restart="never" nodeType="tmRoot"/>
-      </p:par>
-    </p:tnLst>
-  </p:timing>
 </p:sld>
 </file>
 
@@ -4971,132 +4837,361 @@
       </p:grpSpPr>
       <p:sp>
         <p:nvSpPr>
-          <p:cNvPr id="4" name="TextBox 3"/>
-          <p:cNvSpPr txBox="1"/>
-          <p:nvPr/>
-        </p:nvSpPr>
-        <p:spPr>
-          <a:xfrm>
-            <a:off x="179512" y="1988840"/>
-            <a:ext cx="8784976" cy="954107"/>
-          </a:xfrm>
-          <a:prstGeom prst="rect">
-            <a:avLst/>
-          </a:prstGeom>
-          <a:noFill/>
-        </p:spPr>
-        <p:txBody>
-          <a:bodyPr wrap="square" rtlCol="0">
-            <a:spAutoFit/>
+          <p:cNvPr id="2" name="Title 1"/>
+          <p:cNvSpPr>
+            <a:spLocks noGrp="1"/>
+          </p:cNvSpPr>
+          <p:nvPr>
+            <p:ph type="title"/>
+          </p:nvPr>
+        </p:nvSpPr>
+        <p:spPr/>
+        <p:txBody>
+          <a:bodyPr>
+            <a:normAutofit fontScale="90000"/>
           </a:bodyPr>
           <a:lstStyle/>
           <a:p>
-            <a:pPr marL="457200" indent="-457200">
-              <a:buFont typeface="Arial" pitchFamily="34" charset="0"/>
-              <a:buChar char="•"/>
-            </a:pPr>
-            <a:r>
-              <a:rPr lang="en-US" sz="2800" dirty="0">
+            <a:r>
+              <a:rPr lang="ru-RU" dirty="0" smtClean="0"/>
+              <a:t>Рекомендуемое программное обеспечение</a:t>
+            </a:r>
+            <a:endParaRPr lang="ru-RU" dirty="0"/>
+          </a:p>
+        </p:txBody>
+      </p:sp>
+      <p:sp>
+        <p:nvSpPr>
+          <p:cNvPr id="3" name="Content Placeholder 2"/>
+          <p:cNvSpPr>
+            <a:spLocks noGrp="1"/>
+          </p:cNvSpPr>
+          <p:nvPr>
+            <p:ph idx="1"/>
+          </p:nvPr>
+        </p:nvSpPr>
+        <p:spPr/>
+        <p:txBody>
+          <a:bodyPr>
+            <a:normAutofit fontScale="70000" lnSpcReduction="20000"/>
+          </a:bodyPr>
+          <a:lstStyle/>
+          <a:p>
+            <a:r>
+              <a:rPr lang="en-US" dirty="0" smtClean="0">
+                <a:solidFill>
+                  <a:srgbClr val="92D050"/>
+                </a:solidFill>
+              </a:rPr>
+              <a:t>Microsoft Visual Studio 2010 </a:t>
+            </a:r>
+            <a:r>
+              <a:rPr lang="ru-RU" dirty="0" smtClean="0">
+                <a:solidFill>
+                  <a:srgbClr val="92D050"/>
+                </a:solidFill>
+              </a:rPr>
+              <a:t>или 2012</a:t>
+            </a:r>
+          </a:p>
+          <a:p>
+            <a:pPr lvl="1"/>
+            <a:r>
+              <a:rPr lang="ru-RU" dirty="0" smtClean="0">
+                <a:solidFill>
+                  <a:srgbClr val="92D050"/>
+                </a:solidFill>
+              </a:rPr>
+              <a:t>Обязательно установите </a:t>
+            </a:r>
+            <a:r>
+              <a:rPr lang="en-US" dirty="0" smtClean="0">
+                <a:solidFill>
+                  <a:srgbClr val="92D050"/>
+                </a:solidFill>
+              </a:rPr>
+              <a:t>Service Pack 1 </a:t>
+            </a:r>
+            <a:r>
+              <a:rPr lang="ru-RU" dirty="0" smtClean="0">
+                <a:solidFill>
+                  <a:srgbClr val="92D050"/>
+                </a:solidFill>
+              </a:rPr>
+              <a:t>для </a:t>
+            </a:r>
+            <a:r>
+              <a:rPr lang="en-US" dirty="0" smtClean="0">
+                <a:solidFill>
+                  <a:srgbClr val="92D050"/>
+                </a:solidFill>
+              </a:rPr>
+              <a:t>Visual Studio 2010 </a:t>
+            </a:r>
+            <a:r>
+              <a:rPr lang="ru-RU" dirty="0" smtClean="0">
+                <a:solidFill>
+                  <a:srgbClr val="92D050"/>
+                </a:solidFill>
+              </a:rPr>
+              <a:t>и/или </a:t>
+            </a:r>
+            <a:r>
+              <a:rPr lang="en-US" dirty="0" smtClean="0">
+                <a:solidFill>
+                  <a:srgbClr val="92D050"/>
+                </a:solidFill>
+              </a:rPr>
+              <a:t>Update 2 </a:t>
+            </a:r>
+            <a:r>
+              <a:rPr lang="ru-RU" dirty="0" smtClean="0">
+                <a:solidFill>
+                  <a:srgbClr val="92D050"/>
+                </a:solidFill>
+              </a:rPr>
+              <a:t>для </a:t>
+            </a:r>
+            <a:r>
+              <a:rPr lang="en-US" dirty="0" smtClean="0">
+                <a:solidFill>
+                  <a:srgbClr val="92D050"/>
+                </a:solidFill>
+              </a:rPr>
+              <a:t>Visual Studio 2012</a:t>
+            </a:r>
+            <a:endParaRPr lang="ru-RU" dirty="0" smtClean="0">
+              <a:solidFill>
+                <a:srgbClr val="92D050"/>
+              </a:solidFill>
+            </a:endParaRPr>
+          </a:p>
+          <a:p>
+            <a:pPr lvl="1"/>
+            <a:r>
+              <a:rPr lang="en-US" dirty="0" smtClean="0"/>
+              <a:t>NuGet</a:t>
+            </a:r>
+            <a:r>
+              <a:rPr lang="en-US" dirty="0"/>
+              <a:t>: </a:t>
+            </a:r>
+            <a:r>
+              <a:rPr lang="en-US" dirty="0">
+                <a:hlinkClick r:id="rId2"/>
+              </a:rPr>
+              <a:t>http://nuget.org</a:t>
+            </a:r>
+            <a:r>
+              <a:rPr lang="en-US" dirty="0" smtClean="0">
+                <a:hlinkClick r:id="rId2"/>
+              </a:rPr>
+              <a:t>/</a:t>
+            </a:r>
+            <a:endParaRPr lang="en-US" dirty="0" smtClean="0"/>
+          </a:p>
+          <a:p>
+            <a:pPr lvl="1"/>
+            <a:r>
+              <a:rPr lang="en-US" dirty="0" smtClean="0"/>
+              <a:t>Productivity Power </a:t>
+            </a:r>
+            <a:r>
+              <a:rPr lang="en-US" dirty="0"/>
+              <a:t>Tools: </a:t>
+            </a:r>
+            <a:r>
+              <a:rPr lang="en-US" dirty="0">
+                <a:hlinkClick r:id="rId3"/>
+              </a:rPr>
+              <a:t>http://</a:t>
+            </a:r>
+            <a:r>
+              <a:rPr lang="en-US" dirty="0" smtClean="0">
+                <a:hlinkClick r:id="rId3"/>
+              </a:rPr>
+              <a:t>visualstudiogallery.msdn.microsoft.com</a:t>
+            </a:r>
+            <a:endParaRPr lang="en-US" dirty="0" smtClean="0"/>
+          </a:p>
+          <a:p>
+            <a:pPr lvl="1"/>
+            <a:r>
+              <a:rPr lang="en-US" dirty="0"/>
+              <a:t>ReSharper: </a:t>
+            </a:r>
+            <a:r>
+              <a:rPr lang="en-US" dirty="0">
+                <a:hlinkClick r:id="rId4"/>
+              </a:rPr>
+              <a:t>http://www.jetbrains.com/resharper/</a:t>
+            </a:r>
+            <a:endParaRPr lang="en-US" dirty="0" smtClean="0"/>
+          </a:p>
+          <a:p>
+            <a:r>
+              <a:rPr lang="en-US" dirty="0" smtClean="0">
+                <a:solidFill>
+                  <a:srgbClr val="92D050"/>
+                </a:solidFill>
+              </a:rPr>
+              <a:t>Microsoft SQL Server Express 2005 </a:t>
+            </a:r>
+            <a:r>
+              <a:rPr lang="ru-RU" dirty="0" smtClean="0">
+                <a:solidFill>
+                  <a:srgbClr val="92D050"/>
+                </a:solidFill>
+              </a:rPr>
+              <a:t>или выше</a:t>
+            </a:r>
+            <a:endParaRPr lang="en-US" dirty="0" smtClean="0">
+              <a:solidFill>
+                <a:srgbClr val="92D050"/>
+              </a:solidFill>
+            </a:endParaRPr>
+          </a:p>
+          <a:p>
+            <a:pPr lvl="1"/>
+            <a:r>
+              <a:rPr lang="ru-RU" dirty="0" smtClean="0">
                 <a:solidFill>
                   <a:schemeClr val="bg1"/>
                 </a:solidFill>
-                <a:hlinkClick r:id="rId2"/>
-              </a:rPr>
-              <a:t>http://</a:t>
-            </a:r>
-            <a:r>
-              <a:rPr lang="en-US" sz="2800" dirty="0" smtClean="0">
+              </a:rPr>
+              <a:t>Возможно понадобится доустановить </a:t>
+            </a:r>
+            <a:r>
+              <a:rPr lang="en-US" dirty="0">
                 <a:solidFill>
                   <a:schemeClr val="bg1"/>
                 </a:solidFill>
-                <a:hlinkClick r:id="rId2"/>
-              </a:rPr>
-              <a:t>www.tc.belhard.com/</a:t>
-            </a:r>
-            <a:endParaRPr lang="ru-RU" sz="2800" dirty="0" smtClean="0">
+              </a:rPr>
+              <a:t>Microsoft SQL Server Management Studio </a:t>
+            </a:r>
+            <a:r>
+              <a:rPr lang="en-US" dirty="0" smtClean="0">
+                <a:solidFill>
+                  <a:schemeClr val="bg1"/>
+                </a:solidFill>
+              </a:rPr>
+              <a:t>Express</a:t>
+            </a:r>
+            <a:endParaRPr lang="ru-RU" dirty="0" smtClean="0">
               <a:solidFill>
                 <a:schemeClr val="bg1"/>
               </a:solidFill>
             </a:endParaRPr>
           </a:p>
           <a:p>
-            <a:pPr marL="457200" indent="-457200">
-              <a:buFont typeface="Arial" pitchFamily="34" charset="0"/>
-              <a:buChar char="•"/>
-            </a:pPr>
-            <a:r>
-              <a:rPr lang="en-US" sz="2800" dirty="0" smtClean="0">
+            <a:pPr lvl="1"/>
+            <a:r>
+              <a:rPr lang="en-US" dirty="0">
                 <a:solidFill>
                   <a:schemeClr val="bg1"/>
                 </a:solidFill>
-                <a:hlinkClick r:id="rId3"/>
-              </a:rPr>
-              <a:t>http</a:t>
-            </a:r>
-            <a:r>
-              <a:rPr lang="en-US" sz="2800" dirty="0">
+                <a:hlinkClick r:id="rId5"/>
+              </a:rPr>
+              <a:t>http://www.microsoft.com/downloads</a:t>
+            </a:r>
+            <a:r>
+              <a:rPr lang="en-US" dirty="0" smtClean="0">
                 <a:solidFill>
                   <a:schemeClr val="bg1"/>
                 </a:solidFill>
-                <a:hlinkClick r:id="rId3"/>
-              </a:rPr>
-              <a:t>://</a:t>
-            </a:r>
-            <a:r>
-              <a:rPr lang="en-US" sz="2800" dirty="0" smtClean="0">
-                <a:solidFill>
-                  <a:schemeClr val="bg1"/>
-                </a:solidFill>
-                <a:hlinkClick r:id="rId3"/>
-              </a:rPr>
-              <a:t>vk.com/club33848893</a:t>
-            </a:r>
-            <a:endParaRPr lang="en-US" sz="2800" dirty="0"/>
-          </a:p>
-        </p:txBody>
-      </p:sp>
-      <p:sp>
-        <p:nvSpPr>
-          <p:cNvPr id="5" name="Rectangle 4"/>
-          <p:cNvSpPr/>
-          <p:nvPr/>
-        </p:nvSpPr>
-        <p:spPr>
-          <a:xfrm>
-            <a:off x="251520" y="188640"/>
-            <a:ext cx="8640960" cy="1446550"/>
-          </a:xfrm>
-          <a:prstGeom prst="rect">
-            <a:avLst/>
-          </a:prstGeom>
-        </p:spPr>
-        <p:txBody>
-          <a:bodyPr wrap="square">
-            <a:spAutoFit/>
-          </a:bodyPr>
-          <a:lstStyle/>
-          <a:p>
-            <a:pPr lvl="0" algn="ctr"/>
-            <a:r>
-              <a:rPr lang="ru-RU" sz="4400" dirty="0" smtClean="0">
-                <a:solidFill>
-                  <a:schemeClr val="bg1"/>
-                </a:solidFill>
-              </a:rPr>
-              <a:t>Центр обучающих технологий «Белхард»</a:t>
-            </a:r>
-            <a:endParaRPr lang="en-US" sz="4400" dirty="0">
+                <a:hlinkClick r:id="rId5"/>
+              </a:rPr>
+              <a:t>/</a:t>
+            </a:r>
+            <a:endParaRPr lang="en-US" dirty="0">
               <a:solidFill>
                 <a:schemeClr val="bg1"/>
               </a:solidFill>
             </a:endParaRPr>
           </a:p>
+          <a:p>
+            <a:r>
+              <a:rPr lang="en-US" dirty="0" err="1" smtClean="0"/>
+              <a:t>LINQPad</a:t>
+            </a:r>
+            <a:r>
+              <a:rPr lang="en-US" dirty="0"/>
+              <a:t>: </a:t>
+            </a:r>
+            <a:r>
+              <a:rPr lang="en-US" dirty="0">
+                <a:hlinkClick r:id="rId6"/>
+              </a:rPr>
+              <a:t>http://www.linqpad.net</a:t>
+            </a:r>
+            <a:r>
+              <a:rPr lang="en-US" dirty="0" smtClean="0">
+                <a:hlinkClick r:id="rId6"/>
+              </a:rPr>
+              <a:t>/</a:t>
+            </a:r>
+            <a:endParaRPr lang="en-US" dirty="0" smtClean="0"/>
+          </a:p>
+          <a:p>
+            <a:r>
+              <a:rPr lang="en-US" dirty="0" err="1" smtClean="0"/>
+              <a:t>dotPeek</a:t>
+            </a:r>
+            <a:r>
+              <a:rPr lang="en-US" dirty="0" smtClean="0"/>
+              <a:t>: </a:t>
+            </a:r>
+            <a:r>
+              <a:rPr lang="en-US" dirty="0" smtClean="0">
+                <a:hlinkClick r:id="rId7"/>
+              </a:rPr>
+              <a:t>http</a:t>
+            </a:r>
+            <a:r>
+              <a:rPr lang="en-US" dirty="0">
+                <a:hlinkClick r:id="rId7"/>
+              </a:rPr>
+              <a:t>://www.jetbrains.com/decompiler</a:t>
+            </a:r>
+            <a:r>
+              <a:rPr lang="en-US" dirty="0" smtClean="0">
+                <a:hlinkClick r:id="rId7"/>
+              </a:rPr>
+              <a:t>/</a:t>
+            </a:r>
+            <a:endParaRPr lang="en-US" dirty="0" smtClean="0"/>
+          </a:p>
+          <a:p>
+            <a:r>
+              <a:rPr lang="en-US" dirty="0" smtClean="0"/>
+              <a:t>KDiff3: </a:t>
+            </a:r>
+            <a:r>
+              <a:rPr lang="en-US" dirty="0">
+                <a:hlinkClick r:id="rId8"/>
+              </a:rPr>
+              <a:t>http://kdiff3.sourceforge.net</a:t>
+            </a:r>
+            <a:r>
+              <a:rPr lang="en-US" dirty="0" smtClean="0">
+                <a:hlinkClick r:id="rId8"/>
+              </a:rPr>
+              <a:t>/</a:t>
+            </a:r>
+            <a:endParaRPr lang="en-US" dirty="0" smtClean="0"/>
+          </a:p>
+          <a:p>
+            <a:endParaRPr lang="ru-RU" dirty="0" smtClean="0"/>
+          </a:p>
+          <a:p>
+            <a:endParaRPr lang="ru-RU" dirty="0"/>
+          </a:p>
         </p:txBody>
       </p:sp>
     </p:spTree>
     <p:extLst>
       <p:ext uri="{BB962C8B-B14F-4D97-AF65-F5344CB8AC3E}">
-        <p14:creationId xmlns:p14="http://schemas.microsoft.com/office/powerpoint/2010/main" val="1514770362"/>
+        <p14:creationId xmlns:p14="http://schemas.microsoft.com/office/powerpoint/2010/main" val="2844174280"/>
       </p:ext>
     </p:extLst>
   </p:cSld>

</xml_diff>

<commit_message>
Updated software list in introductions
</commit_message>
<xml_diff>
--- a/Presentation/intro.pptx
+++ b/Presentation/intro.pptx
@@ -201,7 +201,7 @@
           <a:p>
             <a:fld id="{B24A7054-7FFB-49F4-A126-5DF6E687FF53}" type="datetimeFigureOut">
               <a:rPr lang="ru-RU" smtClean="0"/>
-              <a:t>04.10.2013</a:t>
+              <a:t>01.11.2013</a:t>
             </a:fld>
             <a:endParaRPr lang="ru-RU"/>
           </a:p>
@@ -1483,7 +1483,7 @@
           <a:p>
             <a:fld id="{8E6E6A2A-E9D3-4A0D-B04A-ABDD367A1E08}" type="datetimeFigureOut">
               <a:rPr lang="ru-RU" smtClean="0"/>
-              <a:t>04.10.2013</a:t>
+              <a:t>01.11.2013</a:t>
             </a:fld>
             <a:endParaRPr lang="ru-RU"/>
           </a:p>
@@ -2928,7 +2928,7 @@
           <a:p>
             <a:fld id="{AC3D3127-B7C4-45E3-9797-C527EC9FDD78}" type="datetimeFigureOut">
               <a:rPr lang="ru-RU" smtClean="0"/>
-              <a:t>04.10.2013</a:t>
+              <a:t>01.11.2013</a:t>
             </a:fld>
             <a:endParaRPr lang="ru-RU"/>
           </a:p>
@@ -3969,15 +3969,7 @@
                   <a:schemeClr val="bg1"/>
                 </a:solidFill>
               </a:rPr>
-              <a:t>19:00, один </a:t>
-            </a:r>
-            <a:r>
-              <a:rPr lang="ru-RU" sz="2800" dirty="0" smtClean="0">
-                <a:solidFill>
-                  <a:schemeClr val="bg1"/>
-                </a:solidFill>
-              </a:rPr>
-              <a:t>перерыв на 5 мин</a:t>
+              <a:t>19:00, один перерыв на 5 мин</a:t>
             </a:r>
           </a:p>
           <a:p>
@@ -3993,11 +3985,6 @@
               </a:rPr>
               <a:t>По возможности предупреждайте об отсутствии на занятии</a:t>
             </a:r>
-            <a:endParaRPr lang="ru-RU" sz="2800" dirty="0" smtClean="0">
-              <a:solidFill>
-                <a:schemeClr val="bg1"/>
-              </a:solidFill>
-            </a:endParaRPr>
           </a:p>
           <a:p>
             <a:pPr marL="285750" indent="-285750">
@@ -4080,15 +4067,7 @@
                   <a:schemeClr val="bg1"/>
                 </a:solidFill>
               </a:rPr>
-              <a:t>Анкета </a:t>
-            </a:r>
-            <a:r>
-              <a:rPr lang="ru-RU" sz="2800" dirty="0" smtClean="0">
-                <a:solidFill>
-                  <a:schemeClr val="bg1"/>
-                </a:solidFill>
-              </a:rPr>
-              <a:t>качества</a:t>
+              <a:t>Анкета качества</a:t>
             </a:r>
             <a:endParaRPr lang="en-US" sz="2800" dirty="0" smtClean="0">
               <a:solidFill>
@@ -4873,7 +4852,7 @@
         <p:spPr/>
         <p:txBody>
           <a:bodyPr>
-            <a:normAutofit fontScale="70000" lnSpcReduction="20000"/>
+            <a:normAutofit fontScale="77500" lnSpcReduction="20000"/>
           </a:bodyPr>
           <a:lstStyle/>
           <a:p>
@@ -4883,82 +4862,15 @@
                   <a:srgbClr val="92D050"/>
                 </a:solidFill>
               </a:rPr>
-              <a:t>Microsoft Visual Studio 2010 </a:t>
-            </a:r>
-            <a:r>
-              <a:rPr lang="ru-RU" dirty="0" smtClean="0">
+              <a:t>Microsoft Visual Studio </a:t>
+            </a:r>
+            <a:r>
+              <a:rPr lang="en-US" dirty="0" smtClean="0">
                 <a:solidFill>
                   <a:srgbClr val="92D050"/>
                 </a:solidFill>
               </a:rPr>
-              <a:t>или 2012</a:t>
-            </a:r>
-          </a:p>
-          <a:p>
-            <a:pPr lvl="1"/>
-            <a:r>
-              <a:rPr lang="ru-RU" dirty="0" smtClean="0">
-                <a:solidFill>
-                  <a:srgbClr val="92D050"/>
-                </a:solidFill>
-              </a:rPr>
-              <a:t>Обязательно установите </a:t>
-            </a:r>
-            <a:r>
-              <a:rPr lang="en-US" dirty="0" smtClean="0">
-                <a:solidFill>
-                  <a:srgbClr val="92D050"/>
-                </a:solidFill>
-              </a:rPr>
-              <a:t>Service Pack 1 </a:t>
-            </a:r>
-            <a:r>
-              <a:rPr lang="ru-RU" dirty="0" smtClean="0">
-                <a:solidFill>
-                  <a:srgbClr val="92D050"/>
-                </a:solidFill>
-              </a:rPr>
-              <a:t>для </a:t>
-            </a:r>
-            <a:r>
-              <a:rPr lang="en-US" dirty="0" smtClean="0">
-                <a:solidFill>
-                  <a:srgbClr val="92D050"/>
-                </a:solidFill>
-              </a:rPr>
-              <a:t>Visual Studio 2010 </a:t>
-            </a:r>
-            <a:r>
-              <a:rPr lang="ru-RU" dirty="0" smtClean="0">
-                <a:solidFill>
-                  <a:srgbClr val="92D050"/>
-                </a:solidFill>
-              </a:rPr>
-              <a:t>и/или </a:t>
-            </a:r>
-            <a:r>
-              <a:rPr lang="en-US" dirty="0" smtClean="0">
-                <a:solidFill>
-                  <a:srgbClr val="92D050"/>
-                </a:solidFill>
-              </a:rPr>
-              <a:t>Update 2 </a:t>
-            </a:r>
-            <a:r>
-              <a:rPr lang="ru-RU" dirty="0" smtClean="0">
-                <a:solidFill>
-                  <a:srgbClr val="92D050"/>
-                </a:solidFill>
-              </a:rPr>
-              <a:t>для </a:t>
-            </a:r>
-            <a:r>
-              <a:rPr lang="en-US" dirty="0" smtClean="0">
-                <a:solidFill>
-                  <a:srgbClr val="92D050"/>
-                </a:solidFill>
-              </a:rPr>
-              <a:t>Visual Studio 2012</a:t>
+              <a:t>2010</a:t>
             </a:r>
             <a:endParaRPr lang="ru-RU" dirty="0" smtClean="0">
               <a:solidFill>
@@ -4969,7 +4881,59 @@
           <a:p>
             <a:pPr lvl="1"/>
             <a:r>
-              <a:rPr lang="en-US" dirty="0" smtClean="0"/>
+              <a:rPr lang="ru-RU" dirty="0" smtClean="0">
+                <a:solidFill>
+                  <a:srgbClr val="FFFF00"/>
+                </a:solidFill>
+              </a:rPr>
+              <a:t>Обязательно установите </a:t>
+            </a:r>
+            <a:r>
+              <a:rPr lang="en-US" dirty="0" smtClean="0">
+                <a:solidFill>
+                  <a:srgbClr val="FFFF00"/>
+                </a:solidFill>
+              </a:rPr>
+              <a:t>Service Pack 1 </a:t>
+            </a:r>
+            <a:r>
+              <a:rPr lang="ru-RU" dirty="0" smtClean="0">
+                <a:solidFill>
+                  <a:srgbClr val="FFFF00"/>
+                </a:solidFill>
+              </a:rPr>
+              <a:t>для </a:t>
+            </a:r>
+            <a:r>
+              <a:rPr lang="en-US" dirty="0" smtClean="0">
+                <a:solidFill>
+                  <a:srgbClr val="FFFF00"/>
+                </a:solidFill>
+              </a:rPr>
+              <a:t>Visual Studio </a:t>
+            </a:r>
+            <a:r>
+              <a:rPr lang="en-US" dirty="0" smtClean="0">
+                <a:solidFill>
+                  <a:srgbClr val="FFFF00"/>
+                </a:solidFill>
+              </a:rPr>
+              <a:t>2010</a:t>
+            </a:r>
+            <a:endParaRPr lang="ru-RU" dirty="0" smtClean="0">
+              <a:solidFill>
+                <a:srgbClr val="FFFF00"/>
+              </a:solidFill>
+            </a:endParaRPr>
+          </a:p>
+          <a:p>
+            <a:pPr lvl="1"/>
+            <a:r>
+              <a:rPr lang="en-US" dirty="0" smtClean="0">
+                <a:solidFill>
+                  <a:srgbClr val="FFFF00"/>
+                </a:solidFill>
+              </a:rPr>
               <a:t>NuGet</a:t>
             </a:r>
             <a:r>
@@ -4987,6 +4951,18 @@
                 <a:hlinkClick r:id="rId2"/>
               </a:rPr>
               <a:t>/</a:t>
+            </a:r>
+            <a:r>
+              <a:rPr lang="ru-RU" dirty="0" smtClean="0"/>
+              <a:t> (Не входит в состав </a:t>
+            </a:r>
+            <a:r>
+              <a:rPr lang="en-US" dirty="0" smtClean="0"/>
+              <a:t>VS 2010</a:t>
+            </a:r>
+            <a:r>
+              <a:rPr lang="ru-RU" dirty="0" smtClean="0"/>
+              <a:t>)</a:t>
             </a:r>
             <a:endParaRPr lang="en-US" dirty="0" smtClean="0"/>
           </a:p>

</xml_diff>

<commit_message>
Updated intro and goodbye presentations
Links to Belhard sites
</commit_message>
<xml_diff>
--- a/Presentation/intro.pptx
+++ b/Presentation/intro.pptx
@@ -3508,7 +3508,7 @@
         <p:spPr>
           <a:xfrm>
             <a:off x="179512" y="1988840"/>
-            <a:ext cx="8784976" cy="954107"/>
+            <a:ext cx="8784976" cy="2246769"/>
           </a:xfrm>
           <a:prstGeom prst="rect">
             <a:avLst/>
@@ -3521,10 +3521,27 @@
           </a:bodyPr>
           <a:lstStyle/>
           <a:p>
-            <a:pPr marL="457200" indent="-457200">
-              <a:buFont typeface="Arial" pitchFamily="34" charset="0"/>
-              <a:buChar char="•"/>
-            </a:pPr>
+            <a:r>
+              <a:rPr lang="ru-RU" sz="2800" dirty="0"/>
+              <a:t>Центр Обучающих Технологий "БелХард"</a:t>
+            </a:r>
+            <a:endParaRPr lang="en-US" sz="2800" dirty="0" smtClean="0">
+              <a:solidFill>
+                <a:schemeClr val="bg1"/>
+              </a:solidFill>
+              <a:hlinkClick r:id="rId2"/>
+            </a:endParaRPr>
+          </a:p>
+          <a:p>
+            <a:r>
+              <a:rPr lang="en-US" sz="2800" dirty="0" smtClean="0">
+                <a:solidFill>
+                  <a:schemeClr val="bg1"/>
+                </a:solidFill>
+                <a:hlinkClick r:id="rId2"/>
+              </a:rPr>
+              <a:t>http</a:t>
+            </a:r>
             <a:r>
               <a:rPr lang="en-US" sz="2800" dirty="0">
                 <a:solidFill>
@@ -3532,7 +3549,7 @@
                 </a:solidFill>
                 <a:hlinkClick r:id="rId2"/>
               </a:rPr>
-              <a:t>http://</a:t>
+              <a:t>://</a:t>
             </a:r>
             <a:r>
               <a:rPr lang="en-US" sz="2800" dirty="0" smtClean="0">
@@ -3541,7 +3558,38 @@
                 </a:solidFill>
                 <a:hlinkClick r:id="rId2"/>
               </a:rPr>
-              <a:t>www.tc.belhard.com/</a:t>
+              <a:t>www.tc.belhard.com</a:t>
+            </a:r>
+            <a:r>
+              <a:rPr lang="en-US" sz="2800" dirty="0" smtClean="0">
+                <a:solidFill>
+                  <a:schemeClr val="bg1"/>
+                </a:solidFill>
+                <a:hlinkClick r:id="rId2"/>
+              </a:rPr>
+              <a:t>/</a:t>
+            </a:r>
+            <a:endParaRPr lang="en-US" sz="2800" dirty="0" smtClean="0">
+              <a:solidFill>
+                <a:schemeClr val="bg1"/>
+              </a:solidFill>
+            </a:endParaRPr>
+          </a:p>
+          <a:p>
+            <a:endParaRPr lang="en-US" sz="2800" dirty="0" smtClean="0">
+              <a:solidFill>
+                <a:schemeClr val="bg1"/>
+              </a:solidFill>
+            </a:endParaRPr>
+          </a:p>
+          <a:p>
+            <a:r>
+              <a:rPr lang="ru-RU" sz="2800" dirty="0" smtClean="0">
+                <a:solidFill>
+                  <a:schemeClr val="bg1"/>
+                </a:solidFill>
+              </a:rPr>
+              <a:t>Группа ВКонтакте</a:t>
             </a:r>
             <a:endParaRPr lang="ru-RU" sz="2800" dirty="0" smtClean="0">
               <a:solidFill>
@@ -3550,10 +3598,6 @@
             </a:endParaRPr>
           </a:p>
           <a:p>
-            <a:pPr marL="457200" indent="-457200">
-              <a:buFont typeface="Arial" pitchFamily="34" charset="0"/>
-              <a:buChar char="•"/>
-            </a:pPr>
             <a:r>
               <a:rPr lang="en-US" sz="2800" dirty="0" smtClean="0">
                 <a:solidFill>
@@ -3561,25 +3605,7 @@
                 </a:solidFill>
                 <a:hlinkClick r:id="rId3"/>
               </a:rPr>
-              <a:t>http</a:t>
-            </a:r>
-            <a:r>
-              <a:rPr lang="en-US" sz="2800" dirty="0">
-                <a:solidFill>
-                  <a:schemeClr val="bg1"/>
-                </a:solidFill>
-                <a:hlinkClick r:id="rId3"/>
-              </a:rPr>
-              <a:t>://</a:t>
-            </a:r>
-            <a:r>
-              <a:rPr lang="en-US" sz="2800" dirty="0" smtClean="0">
-                <a:solidFill>
-                  <a:schemeClr val="bg1"/>
-                </a:solidFill>
-                <a:hlinkClick r:id="rId3"/>
-              </a:rPr>
-              <a:t>vk.com/club33848893</a:t>
+              <a:t>http://vk.com/tcbelhard</a:t>
             </a:r>
             <a:endParaRPr lang="en-US" sz="2800" dirty="0"/>
           </a:p>
@@ -4862,15 +4888,7 @@
                   <a:srgbClr val="92D050"/>
                 </a:solidFill>
               </a:rPr>
-              <a:t>Microsoft Visual Studio </a:t>
-            </a:r>
-            <a:r>
-              <a:rPr lang="en-US" dirty="0" smtClean="0">
-                <a:solidFill>
-                  <a:srgbClr val="92D050"/>
-                </a:solidFill>
-              </a:rPr>
-              <a:t>2010</a:t>
+              <a:t>Microsoft Visual Studio 2010</a:t>
             </a:r>
             <a:endParaRPr lang="ru-RU" dirty="0" smtClean="0">
               <a:solidFill>
@@ -4910,15 +4928,7 @@
                   <a:srgbClr val="FFFF00"/>
                 </a:solidFill>
               </a:rPr>
-              <a:t>Visual Studio </a:t>
-            </a:r>
-            <a:r>
-              <a:rPr lang="en-US" dirty="0" smtClean="0">
-                <a:solidFill>
-                  <a:srgbClr val="FFFF00"/>
-                </a:solidFill>
-              </a:rPr>
-              <a:t>2010</a:t>
+              <a:t>Visual Studio 2010</a:t>
             </a:r>
             <a:endParaRPr lang="ru-RU" dirty="0" smtClean="0">
               <a:solidFill>

</xml_diff>

<commit_message>
Added info about Dev Essenttials
</commit_message>
<xml_diff>
--- a/Presentation/intro.pptx
+++ b/Presentation/intro.pptx
@@ -5,7 +5,7 @@
     <p:sldMasterId id="2147483648" r:id="rId1"/>
   </p:sldMasterIdLst>
   <p:notesMasterIdLst>
-    <p:notesMasterId r:id="rId13"/>
+    <p:notesMasterId r:id="rId12"/>
   </p:notesMasterIdLst>
   <p:sldIdLst>
     <p:sldId id="257" r:id="rId2"/>
@@ -17,8 +17,7 @@
     <p:sldId id="262" r:id="rId8"/>
     <p:sldId id="269" r:id="rId9"/>
     <p:sldId id="268" r:id="rId10"/>
-    <p:sldId id="271" r:id="rId11"/>
-    <p:sldId id="263" r:id="rId12"/>
+    <p:sldId id="263" r:id="rId11"/>
   </p:sldIdLst>
   <p:sldSz cx="9144000" cy="6858000" type="screen4x3"/>
   <p:notesSz cx="6858000" cy="9144000"/>
@@ -202,7 +201,7 @@
           <a:p>
             <a:fld id="{B24A7054-7FFB-49F4-A126-5DF6E687FF53}" type="datetimeFigureOut">
               <a:rPr lang="ru-RU" smtClean="0"/>
-              <a:t>20.04.2014</a:t>
+              <a:t>24.11.2015</a:t>
             </a:fld>
             <a:endParaRPr lang="ru-RU"/>
           </a:p>
@@ -1484,7 +1483,7 @@
           <a:p>
             <a:fld id="{8E6E6A2A-E9D3-4A0D-B04A-ABDD367A1E08}" type="datetimeFigureOut">
               <a:rPr lang="ru-RU" smtClean="0"/>
-              <a:t>20.04.2014</a:t>
+              <a:t>24.11.2015</a:t>
             </a:fld>
             <a:endParaRPr lang="ru-RU"/>
           </a:p>
@@ -2929,7 +2928,7 @@
           <a:p>
             <a:fld id="{AC3D3127-B7C4-45E3-9797-C527EC9FDD78}" type="datetimeFigureOut">
               <a:rPr lang="ru-RU" smtClean="0"/>
-              <a:t>20.04.2014</a:t>
+              <a:t>24.11.2015</a:t>
             </a:fld>
             <a:endParaRPr lang="ru-RU"/>
           </a:p>
@@ -3502,139 +3501,6 @@
       </p:grpSpPr>
       <p:sp>
         <p:nvSpPr>
-          <p:cNvPr id="2" name="Title 1"/>
-          <p:cNvSpPr>
-            <a:spLocks noGrp="1"/>
-          </p:cNvSpPr>
-          <p:nvPr>
-            <p:ph type="title"/>
-          </p:nvPr>
-        </p:nvSpPr>
-        <p:spPr/>
-        <p:txBody>
-          <a:bodyPr/>
-          <a:lstStyle/>
-          <a:p>
-            <a:r>
-              <a:rPr lang="en-US" dirty="0" smtClean="0"/>
-              <a:t>Microsoft </a:t>
-            </a:r>
-            <a:r>
-              <a:rPr lang="en-US" dirty="0" err="1" smtClean="0"/>
-              <a:t>DreamSpark</a:t>
-            </a:r>
-            <a:endParaRPr lang="ru-RU" dirty="0"/>
-          </a:p>
-        </p:txBody>
-      </p:sp>
-      <p:sp>
-        <p:nvSpPr>
-          <p:cNvPr id="3" name="Content Placeholder 2"/>
-          <p:cNvSpPr>
-            <a:spLocks noGrp="1"/>
-          </p:cNvSpPr>
-          <p:nvPr>
-            <p:ph idx="1"/>
-          </p:nvPr>
-        </p:nvSpPr>
-        <p:spPr/>
-        <p:txBody>
-          <a:bodyPr/>
-          <a:lstStyle/>
-          <a:p>
-            <a:pPr marL="0" indent="0">
-              <a:buNone/>
-            </a:pPr>
-            <a:r>
-              <a:rPr lang="en-US" dirty="0" err="1" smtClean="0"/>
-              <a:t>DreamSpark</a:t>
-            </a:r>
-            <a:r>
-              <a:rPr lang="en-US" dirty="0" smtClean="0"/>
-              <a:t> </a:t>
-            </a:r>
-            <a:r>
-              <a:rPr lang="ru-RU" dirty="0" smtClean="0"/>
-              <a:t>– инициатива </a:t>
-            </a:r>
-            <a:r>
-              <a:rPr lang="en-US" dirty="0" smtClean="0"/>
-              <a:t>Microsoft </a:t>
-            </a:r>
-            <a:r>
-              <a:rPr lang="ru-RU" dirty="0" smtClean="0"/>
-              <a:t>предоставлющая студентам и учебным учреждениям бесплатный доступ к програмному обеспечению </a:t>
-            </a:r>
-            <a:r>
-              <a:rPr lang="en-US" dirty="0" smtClean="0"/>
-              <a:t>Microsoft.</a:t>
-            </a:r>
-          </a:p>
-          <a:p>
-            <a:pPr marL="0" indent="0">
-              <a:buNone/>
-            </a:pPr>
-            <a:endParaRPr lang="en-US" dirty="0"/>
-          </a:p>
-          <a:p>
-            <a:pPr marL="0" indent="0">
-              <a:buNone/>
-            </a:pPr>
-            <a:r>
-              <a:rPr lang="en-US" dirty="0">
-                <a:hlinkClick r:id="rId2"/>
-              </a:rPr>
-              <a:t>https://www.dreamspark.com</a:t>
-            </a:r>
-            <a:r>
-              <a:rPr lang="en-US" dirty="0" smtClean="0">
-                <a:hlinkClick r:id="rId2"/>
-              </a:rPr>
-              <a:t>/</a:t>
-            </a:r>
-            <a:endParaRPr lang="ru-RU" dirty="0"/>
-          </a:p>
-        </p:txBody>
-      </p:sp>
-    </p:spTree>
-    <p:extLst>
-      <p:ext uri="{BB962C8B-B14F-4D97-AF65-F5344CB8AC3E}">
-        <p14:creationId xmlns:p14="http://schemas.microsoft.com/office/powerpoint/2010/main" val="2224165556"/>
-      </p:ext>
-    </p:extLst>
-  </p:cSld>
-  <p:clrMapOvr>
-    <a:masterClrMapping/>
-  </p:clrMapOvr>
-  <p:timing>
-    <p:tnLst>
-      <p:par>
-        <p:cTn id="1" dur="indefinite" restart="never" nodeType="tmRoot"/>
-      </p:par>
-    </p:tnLst>
-  </p:timing>
-</p:sld>
-</file>
-
-<file path=ppt/slides/slide11.xml><?xml version="1.0" encoding="utf-8"?>
-<p:sld xmlns:a="http://schemas.openxmlformats.org/drawingml/2006/main" xmlns:r="http://schemas.openxmlformats.org/officeDocument/2006/relationships" xmlns:p="http://schemas.openxmlformats.org/presentationml/2006/main">
-  <p:cSld>
-    <p:spTree>
-      <p:nvGrpSpPr>
-        <p:cNvPr id="1" name=""/>
-        <p:cNvGrpSpPr/>
-        <p:nvPr/>
-      </p:nvGrpSpPr>
-      <p:grpSpPr>
-        <a:xfrm>
-          <a:off x="0" y="0"/>
-          <a:ext cx="0" cy="0"/>
-          <a:chOff x="0" y="0"/>
-          <a:chExt cx="0" cy="0"/>
-        </a:xfrm>
-      </p:grpSpPr>
-      <p:sp>
-        <p:nvSpPr>
           <p:cNvPr id="4" name="TextBox 3"/>
           <p:cNvSpPr txBox="1"/>
           <p:nvPr/>
@@ -3664,7 +3530,19 @@
             </a:pPr>
             <a:r>
               <a:rPr lang="ru-RU" sz="2800" dirty="0"/>
-              <a:t>Центр Обучающих Технологий "</a:t>
+              <a:t>Центр Обучающих </a:t>
+            </a:r>
+            <a:r>
+              <a:rPr lang="ru-RU" sz="2800" dirty="0" smtClean="0"/>
+              <a:t>Технологий </a:t>
+            </a:r>
+            <a:r>
+              <a:rPr lang="ru-RU" sz="2800" dirty="0" smtClean="0">
+                <a:solidFill>
+                  <a:schemeClr val="bg1"/>
+                </a:solidFill>
+              </a:rPr>
+              <a:t>«</a:t>
             </a:r>
             <a:r>
               <a:rPr lang="ru-RU" sz="2800" dirty="0" smtClean="0"/>
@@ -3672,9 +3550,11 @@
             </a:r>
             <a:r>
               <a:rPr lang="ru-RU" sz="2800" dirty="0" smtClean="0">
-                <a:hlinkClick r:id="rId2"/>
-              </a:rPr>
-              <a:t>“</a:t>
+                <a:solidFill>
+                  <a:schemeClr val="bg1"/>
+                </a:solidFill>
+              </a:rPr>
+              <a:t>»</a:t>
             </a:r>
             <a:r>
               <a:rPr lang="en-US" sz="2800" dirty="0" smtClean="0"/>
@@ -3835,7 +3715,23 @@
                   <a:schemeClr val="bg1"/>
                 </a:solidFill>
               </a:rPr>
-              <a:t>Центр обучающих технологий «Белхард»</a:t>
+              <a:t>Центр обучающих </a:t>
+            </a:r>
+            <a:r>
+              <a:rPr lang="ru-RU" sz="4400" dirty="0" smtClean="0">
+                <a:solidFill>
+                  <a:schemeClr val="bg1"/>
+                </a:solidFill>
+              </a:rPr>
+              <a:t>технологий </a:t>
+            </a:r>
+            <a:r>
+              <a:rPr lang="ru-RU" sz="4400" dirty="0" smtClean="0">
+                <a:solidFill>
+                  <a:schemeClr val="bg1"/>
+                </a:solidFill>
+              </a:rPr>
+              <a:t>«Белхард»</a:t>
             </a:r>
             <a:endParaRPr lang="en-US" sz="4400" dirty="0">
               <a:solidFill>
@@ -4289,15 +4185,7 @@
                   <a:schemeClr val="bg1"/>
                 </a:solidFill>
               </a:rPr>
-              <a:t>Анкета </a:t>
-            </a:r>
-            <a:r>
-              <a:rPr lang="ru-RU" sz="2800" dirty="0" smtClean="0">
-                <a:solidFill>
-                  <a:schemeClr val="bg1"/>
-                </a:solidFill>
-              </a:rPr>
-              <a:t>качества</a:t>
+              <a:t>Анкета качества</a:t>
             </a:r>
             <a:endParaRPr lang="en-US" sz="2800" dirty="0" smtClean="0">
               <a:solidFill>
@@ -5058,7 +4946,31 @@
                   <a:srgbClr val="92D050"/>
                 </a:solidFill>
               </a:rPr>
-              <a:t>Microsoft Visual Studio 2010</a:t>
+              <a:t>Microsoft Visual Studio </a:t>
+            </a:r>
+            <a:r>
+              <a:rPr lang="en-US" dirty="0" smtClean="0">
+                <a:solidFill>
+                  <a:srgbClr val="92D050"/>
+                </a:solidFill>
+              </a:rPr>
+              <a:t>2010</a:t>
+            </a:r>
+            <a:r>
+              <a:rPr lang="ru-RU" dirty="0" smtClean="0">
+                <a:solidFill>
+                  <a:srgbClr val="92D050"/>
+                </a:solidFill>
+              </a:rPr>
+              <a:t> </a:t>
+            </a:r>
+            <a:r>
+              <a:rPr lang="ru-RU" dirty="0" smtClean="0">
+                <a:solidFill>
+                  <a:srgbClr val="92D050"/>
+                </a:solidFill>
+              </a:rPr>
+              <a:t>или выше</a:t>
             </a:r>
             <a:endParaRPr lang="ru-RU" dirty="0" smtClean="0">
               <a:solidFill>
@@ -5150,11 +5062,7 @@
             <a:pPr lvl="1"/>
             <a:r>
               <a:rPr lang="en-US" dirty="0" smtClean="0"/>
-              <a:t>Productivity Power </a:t>
-            </a:r>
-            <a:r>
-              <a:rPr lang="en-US" dirty="0" smtClean="0"/>
-              <a:t>Tools:</a:t>
+              <a:t>Productivity Power Tools:</a:t>
             </a:r>
             <a:br>
               <a:rPr lang="en-US" dirty="0" smtClean="0"/>

</xml_diff>